<commit_message>
Úprava dokumentace podle připomínek z konzultace
</commit_message>
<xml_diff>
--- a/Dokumentace/obhajoba/janecka.pptx
+++ b/Dokumentace/obhajoba/janecka.pptx
@@ -578,7 +578,7 @@
           <a:effectLst/>
           <a:extLst>
             <a:ext uri="{91240B29-F687-4f45-9708-019B960494DF}">
-              <a14:hiddenLine xmlns="" xmlns:a14="http://schemas.microsoft.com/office/drawing/2010/main" w="9525">
+              <a14:hiddenLine xmlns:a14="http://schemas.microsoft.com/office/drawing/2010/main" xmlns="" w="9525">
                 <a:solidFill>
                   <a:srgbClr val="000000"/>
                 </a:solidFill>
@@ -2100,7 +2100,7 @@
           <a:ln/>
           <a:extLst>
             <a:ext uri="{91240B29-F687-4f45-9708-019B960494DF}">
-              <a14:hiddenLine xmlns="" xmlns:a14="http://schemas.microsoft.com/office/drawing/2010/main" w="9525">
+              <a14:hiddenLine xmlns:a14="http://schemas.microsoft.com/office/drawing/2010/main" xmlns="" w="9525">
                 <a:solidFill>
                   <a:srgbClr val="000000"/>
                 </a:solidFill>
@@ -2375,7 +2375,7 @@
           <a:ln/>
           <a:extLst>
             <a:ext uri="{91240B29-F687-4f45-9708-019B960494DF}">
-              <a14:hiddenLine xmlns="" xmlns:a14="http://schemas.microsoft.com/office/drawing/2010/main" w="9525">
+              <a14:hiddenLine xmlns:a14="http://schemas.microsoft.com/office/drawing/2010/main" xmlns="" w="9525">
                 <a:solidFill>
                   <a:srgbClr val="000000"/>
                 </a:solidFill>
@@ -2658,7 +2658,7 @@
           <a:ln/>
           <a:extLst>
             <a:ext uri="{91240B29-F687-4f45-9708-019B960494DF}">
-              <a14:hiddenLine xmlns="" xmlns:a14="http://schemas.microsoft.com/office/drawing/2010/main" w="9525">
+              <a14:hiddenLine xmlns:a14="http://schemas.microsoft.com/office/drawing/2010/main" xmlns="" w="9525">
                 <a:solidFill>
                   <a:srgbClr val="000000"/>
                 </a:solidFill>
@@ -3284,7 +3284,7 @@
           <a:ln/>
           <a:extLst>
             <a:ext uri="{91240B29-F687-4f45-9708-019B960494DF}">
-              <a14:hiddenLine xmlns="" xmlns:a14="http://schemas.microsoft.com/office/drawing/2010/main" w="9525">
+              <a14:hiddenLine xmlns:a14="http://schemas.microsoft.com/office/drawing/2010/main" xmlns="" w="9525">
                 <a:solidFill>
                   <a:srgbClr val="000000"/>
                 </a:solidFill>
@@ -3623,7 +3623,7 @@
           <a:ln/>
           <a:extLst>
             <a:ext uri="{91240B29-F687-4f45-9708-019B960494DF}">
-              <a14:hiddenLine xmlns="" xmlns:a14="http://schemas.microsoft.com/office/drawing/2010/main" w="9525">
+              <a14:hiddenLine xmlns:a14="http://schemas.microsoft.com/office/drawing/2010/main" xmlns="" w="9525">
                 <a:solidFill>
                   <a:srgbClr val="000000"/>
                 </a:solidFill>
@@ -4100,7 +4100,7 @@
           <a:ln/>
           <a:extLst>
             <a:ext uri="{91240B29-F687-4f45-9708-019B960494DF}">
-              <a14:hiddenLine xmlns="" xmlns:a14="http://schemas.microsoft.com/office/drawing/2010/main" w="9525">
+              <a14:hiddenLine xmlns:a14="http://schemas.microsoft.com/office/drawing/2010/main" xmlns="" w="9525">
                 <a:solidFill>
                   <a:srgbClr val="000000"/>
                 </a:solidFill>
@@ -4529,7 +4529,7 @@
           <a:ln/>
           <a:extLst>
             <a:ext uri="{91240B29-F687-4f45-9708-019B960494DF}">
-              <a14:hiddenLine xmlns="" xmlns:a14="http://schemas.microsoft.com/office/drawing/2010/main" w="9525">
+              <a14:hiddenLine xmlns:a14="http://schemas.microsoft.com/office/drawing/2010/main" xmlns="" w="9525">
                 <a:solidFill>
                   <a:srgbClr val="000000"/>
                 </a:solidFill>
@@ -6717,8 +6717,8 @@
         </p:nvSpPr>
         <p:spPr>
           <a:xfrm>
-            <a:off x="4404359" y="5541264"/>
-            <a:ext cx="3383280" cy="374624"/>
+            <a:off x="3509574" y="5498861"/>
+            <a:ext cx="5172849" cy="369332"/>
           </a:xfrm>
           <a:prstGeom prst="rect">
             <a:avLst/>
@@ -6735,6 +6735,27 @@
               <a:rPr lang="cs-CZ" dirty="0"/>
               <a:t>Obr. 1: Ukázka OOP přístupu</a:t>
             </a:r>
+            <a:r>
+              <a:rPr lang="en-US" dirty="0"/>
+              <a:t>. [</a:t>
+            </a:r>
+            <a:r>
+              <a:rPr lang="en-US" dirty="0" err="1"/>
+              <a:t>Zdroj</a:t>
+            </a:r>
+            <a:r>
+              <a:rPr lang="en-US" dirty="0"/>
+              <a:t> </a:t>
+            </a:r>
+            <a:r>
+              <a:rPr lang="en-US" dirty="0" err="1"/>
+              <a:t>vlastní</a:t>
+            </a:r>
+            <a:r>
+              <a:rPr lang="en-US" dirty="0"/>
+              <a:t>]</a:t>
+            </a:r>
+            <a:endParaRPr lang="cs-CZ" dirty="0"/>
           </a:p>
         </p:txBody>
       </p:sp>
@@ -6868,8 +6889,8 @@
         </p:nvSpPr>
         <p:spPr>
           <a:xfrm>
-            <a:off x="4404359" y="5541264"/>
-            <a:ext cx="4241498" cy="369332"/>
+            <a:off x="3107434" y="5419344"/>
+            <a:ext cx="5977129" cy="369332"/>
           </a:xfrm>
           <a:prstGeom prst="rect">
             <a:avLst/>
@@ -6894,6 +6915,27 @@
               <a:rPr lang="cs-CZ" dirty="0"/>
               <a:t> OOP</a:t>
             </a:r>
+            <a:r>
+              <a:rPr lang="en-US" dirty="0"/>
+              <a:t>. [</a:t>
+            </a:r>
+            <a:r>
+              <a:rPr lang="en-US" dirty="0" err="1"/>
+              <a:t>Zdroj</a:t>
+            </a:r>
+            <a:r>
+              <a:rPr lang="en-US" dirty="0"/>
+              <a:t> </a:t>
+            </a:r>
+            <a:r>
+              <a:rPr lang="en-US" dirty="0" err="1"/>
+              <a:t>vlastní</a:t>
+            </a:r>
+            <a:r>
+              <a:rPr lang="en-US" dirty="0"/>
+              <a:t>]</a:t>
+            </a:r>
+            <a:endParaRPr lang="cs-CZ" dirty="0"/>
           </a:p>
         </p:txBody>
       </p:sp>
@@ -7062,8 +7104,8 @@
         </p:nvSpPr>
         <p:spPr>
           <a:xfrm>
-            <a:off x="4426021" y="6464589"/>
-            <a:ext cx="3339951" cy="369332"/>
+            <a:off x="3450495" y="6467522"/>
+            <a:ext cx="5291003" cy="369332"/>
           </a:xfrm>
           <a:prstGeom prst="rect">
             <a:avLst/>
@@ -7096,6 +7138,27 @@
               <a:rPr lang="cs-CZ" dirty="0"/>
               <a:t>OP přístupu</a:t>
             </a:r>
+            <a:r>
+              <a:rPr lang="en-US" dirty="0"/>
+              <a:t>. [</a:t>
+            </a:r>
+            <a:r>
+              <a:rPr lang="en-US" dirty="0" err="1"/>
+              <a:t>Zdroj</a:t>
+            </a:r>
+            <a:r>
+              <a:rPr lang="en-US" dirty="0"/>
+              <a:t> </a:t>
+            </a:r>
+            <a:r>
+              <a:rPr lang="en-US" dirty="0" err="1"/>
+              <a:t>vlastní</a:t>
+            </a:r>
+            <a:r>
+              <a:rPr lang="en-US" dirty="0"/>
+              <a:t>]</a:t>
+            </a:r>
+            <a:endParaRPr lang="cs-CZ" dirty="0"/>
           </a:p>
         </p:txBody>
       </p:sp>
@@ -7259,8 +7322,8 @@
         </p:nvSpPr>
         <p:spPr>
           <a:xfrm>
-            <a:off x="4404359" y="5541264"/>
-            <a:ext cx="4241498" cy="369332"/>
+            <a:off x="3676751" y="5168322"/>
+            <a:ext cx="5696713" cy="369332"/>
           </a:xfrm>
           <a:prstGeom prst="rect">
             <a:avLst/>
@@ -7301,6 +7364,27 @@
               <a:rPr lang="cs-CZ" dirty="0"/>
               <a:t>OP</a:t>
             </a:r>
+            <a:r>
+              <a:rPr lang="en-US" dirty="0"/>
+              <a:t>. [</a:t>
+            </a:r>
+            <a:r>
+              <a:rPr lang="en-US" dirty="0" err="1"/>
+              <a:t>Zdroj</a:t>
+            </a:r>
+            <a:r>
+              <a:rPr lang="en-US" dirty="0"/>
+              <a:t> </a:t>
+            </a:r>
+            <a:r>
+              <a:rPr lang="en-US" dirty="0" err="1"/>
+              <a:t>vlastní</a:t>
+            </a:r>
+            <a:r>
+              <a:rPr lang="en-US" dirty="0"/>
+              <a:t>]</a:t>
+            </a:r>
+            <a:endParaRPr lang="cs-CZ" dirty="0"/>
           </a:p>
         </p:txBody>
       </p:sp>
@@ -7469,8 +7553,8 @@
         </p:nvSpPr>
         <p:spPr>
           <a:xfrm>
-            <a:off x="4903405" y="6331424"/>
-            <a:ext cx="2816979" cy="369332"/>
+            <a:off x="3856828" y="6225811"/>
+            <a:ext cx="4478339" cy="369332"/>
           </a:xfrm>
           <a:prstGeom prst="rect">
             <a:avLst/>
@@ -7487,6 +7571,27 @@
               <a:rPr lang="cs-CZ" dirty="0"/>
               <a:t>Obr. 5: Rozdíl ve výkonu</a:t>
             </a:r>
+            <a:r>
+              <a:rPr lang="en-US" dirty="0"/>
+              <a:t>. [</a:t>
+            </a:r>
+            <a:r>
+              <a:rPr lang="en-US" dirty="0" err="1"/>
+              <a:t>Zdroj</a:t>
+            </a:r>
+            <a:r>
+              <a:rPr lang="en-US" dirty="0"/>
+              <a:t> </a:t>
+            </a:r>
+            <a:r>
+              <a:rPr lang="en-US" dirty="0" err="1"/>
+              <a:t>vlastní</a:t>
+            </a:r>
+            <a:r>
+              <a:rPr lang="en-US" dirty="0"/>
+              <a:t>]</a:t>
+            </a:r>
+            <a:endParaRPr lang="cs-CZ" dirty="0"/>
           </a:p>
         </p:txBody>
       </p:sp>
@@ -7656,8 +7761,8 @@
         </p:nvSpPr>
         <p:spPr>
           <a:xfrm>
-            <a:off x="4687509" y="5473445"/>
-            <a:ext cx="2816979" cy="369332"/>
+            <a:off x="3943953" y="5363717"/>
+            <a:ext cx="4304091" cy="369332"/>
           </a:xfrm>
           <a:prstGeom prst="rect">
             <a:avLst/>
@@ -7677,6 +7782,26 @@
             <a:r>
               <a:rPr lang="cs-CZ" dirty="0" err="1"/>
               <a:t>vTune</a:t>
+            </a:r>
+            <a:r>
+              <a:rPr lang="en-US" dirty="0"/>
+              <a:t>. [</a:t>
+            </a:r>
+            <a:r>
+              <a:rPr lang="en-US" dirty="0" err="1"/>
+              <a:t>Zdroj</a:t>
+            </a:r>
+            <a:r>
+              <a:rPr lang="en-US" dirty="0"/>
+              <a:t> </a:t>
+            </a:r>
+            <a:r>
+              <a:rPr lang="en-US" dirty="0" err="1"/>
+              <a:t>vlastní</a:t>
+            </a:r>
+            <a:r>
+              <a:rPr lang="en-US" dirty="0"/>
+              <a:t>]</a:t>
             </a:r>
             <a:endParaRPr lang="cs-CZ" dirty="0"/>
           </a:p>

</xml_diff>

<commit_message>
Úprava prezentace k obhajobě
</commit_message>
<xml_diff>
--- a/Dokumentace/obhajoba/janecka.pptx
+++ b/Dokumentace/obhajoba/janecka.pptx
@@ -5,28 +5,24 @@
     <p:sldMasterId id="2147483660" r:id="rId1"/>
   </p:sldMasterIdLst>
   <p:notesMasterIdLst>
-    <p:notesMasterId r:id="rId21"/>
+    <p:notesMasterId r:id="rId17"/>
   </p:notesMasterIdLst>
   <p:sldIdLst>
     <p:sldId id="256" r:id="rId2"/>
     <p:sldId id="257" r:id="rId3"/>
     <p:sldId id="258" r:id="rId4"/>
     <p:sldId id="259" r:id="rId5"/>
-    <p:sldId id="264" r:id="rId6"/>
-    <p:sldId id="265" r:id="rId7"/>
-    <p:sldId id="266" r:id="rId8"/>
-    <p:sldId id="267" r:id="rId9"/>
-    <p:sldId id="268" r:id="rId10"/>
-    <p:sldId id="260" r:id="rId11"/>
-    <p:sldId id="261" r:id="rId12"/>
-    <p:sldId id="262" r:id="rId13"/>
-    <p:sldId id="269" r:id="rId14"/>
-    <p:sldId id="270" r:id="rId15"/>
-    <p:sldId id="271" r:id="rId16"/>
-    <p:sldId id="272" r:id="rId17"/>
-    <p:sldId id="273" r:id="rId18"/>
-    <p:sldId id="274" r:id="rId19"/>
-    <p:sldId id="263" r:id="rId20"/>
+    <p:sldId id="261" r:id="rId6"/>
+    <p:sldId id="277" r:id="rId7"/>
+    <p:sldId id="262" r:id="rId8"/>
+    <p:sldId id="269" r:id="rId9"/>
+    <p:sldId id="270" r:id="rId10"/>
+    <p:sldId id="271" r:id="rId11"/>
+    <p:sldId id="272" r:id="rId12"/>
+    <p:sldId id="273" r:id="rId13"/>
+    <p:sldId id="276" r:id="rId14"/>
+    <p:sldId id="263" r:id="rId15"/>
+    <p:sldId id="275" r:id="rId16"/>
   </p:sldIdLst>
   <p:sldSz cx="12192000" cy="6858000"/>
   <p:notesSz cx="6858000" cy="9144000"/>
@@ -215,7 +211,7 @@
           <a:p>
             <a:fld id="{8FA2AE62-7EE5-44AF-A94F-6AF6867386C8}" type="datetimeFigureOut">
               <a:rPr lang="cs-CZ" smtClean="0"/>
-              <a:t>23.04.2023</a:t>
+              <a:t>30.04.2023</a:t>
             </a:fld>
             <a:endParaRPr lang="cs-CZ"/>
           </a:p>
@@ -578,7 +574,7 @@
           <a:effectLst/>
           <a:extLst>
             <a:ext uri="{91240B29-F687-4f45-9708-019B960494DF}">
-              <a14:hiddenLine xmlns:a14="http://schemas.microsoft.com/office/drawing/2010/main" xmlns="" w="9525">
+              <a14:hiddenLine xmlns="" xmlns:a14="http://schemas.microsoft.com/office/drawing/2010/main" w="9525">
                 <a:solidFill>
                   <a:srgbClr val="000000"/>
                 </a:solidFill>
@@ -770,7 +766,7 @@
           <a:p>
             <a:fld id="{C81F43A2-7882-4B84-B74B-426257D542D9}" type="datetime1">
               <a:rPr lang="cs-CZ" smtClean="0"/>
-              <a:t>23.04.2023</a:t>
+              <a:t>30.04.2023</a:t>
             </a:fld>
             <a:endParaRPr lang="cs-CZ"/>
           </a:p>
@@ -1088,7 +1084,7 @@
           <a:p>
             <a:fld id="{CB657D2E-32B3-441D-861C-BD54B5AA9B5E}" type="datetime1">
               <a:rPr lang="cs-CZ" smtClean="0"/>
-              <a:t>23.04.2023</a:t>
+              <a:t>30.04.2023</a:t>
             </a:fld>
             <a:endParaRPr lang="cs-CZ"/>
           </a:p>
@@ -1576,7 +1572,7 @@
           <a:p>
             <a:fld id="{CE5FBB6C-B1B1-4520-AB00-35498D8F5441}" type="datetime1">
               <a:rPr lang="cs-CZ" smtClean="0"/>
-              <a:t>23.04.2023</a:t>
+              <a:t>30.04.2023</a:t>
             </a:fld>
             <a:endParaRPr lang="cs-CZ"/>
           </a:p>
@@ -1945,7 +1941,7 @@
           <a:p>
             <a:fld id="{8F2B3BE8-00F5-4C02-9402-5046DFC44582}" type="datetime1">
               <a:rPr lang="cs-CZ" smtClean="0"/>
-              <a:t>23.04.2023</a:t>
+              <a:t>30.04.2023</a:t>
             </a:fld>
             <a:endParaRPr lang="cs-CZ"/>
           </a:p>
@@ -2100,7 +2096,7 @@
           <a:ln/>
           <a:extLst>
             <a:ext uri="{91240B29-F687-4f45-9708-019B960494DF}">
-              <a14:hiddenLine xmlns:a14="http://schemas.microsoft.com/office/drawing/2010/main" xmlns="" w="9525">
+              <a14:hiddenLine xmlns="" xmlns:a14="http://schemas.microsoft.com/office/drawing/2010/main" w="9525">
                 <a:solidFill>
                   <a:srgbClr val="000000"/>
                 </a:solidFill>
@@ -2218,7 +2214,7 @@
           <a:p>
             <a:fld id="{644C92DE-DF7A-4302-93A4-F9D2279DDEE6}" type="datetime1">
               <a:rPr lang="cs-CZ" smtClean="0"/>
-              <a:t>23.04.2023</a:t>
+              <a:t>30.04.2023</a:t>
             </a:fld>
             <a:endParaRPr lang="cs-CZ"/>
           </a:p>
@@ -2375,7 +2371,7 @@
           <a:ln/>
           <a:extLst>
             <a:ext uri="{91240B29-F687-4f45-9708-019B960494DF}">
-              <a14:hiddenLine xmlns:a14="http://schemas.microsoft.com/office/drawing/2010/main" xmlns="" w="9525">
+              <a14:hiddenLine xmlns="" xmlns:a14="http://schemas.microsoft.com/office/drawing/2010/main" w="9525">
                 <a:solidFill>
                   <a:srgbClr val="000000"/>
                 </a:solidFill>
@@ -2503,7 +2499,7 @@
           <a:p>
             <a:fld id="{8C36A006-CC6A-4951-96E4-51634B9DFF2D}" type="datetime1">
               <a:rPr lang="cs-CZ" smtClean="0"/>
-              <a:t>23.04.2023</a:t>
+              <a:t>30.04.2023</a:t>
             </a:fld>
             <a:endParaRPr lang="cs-CZ"/>
           </a:p>
@@ -2658,7 +2654,7 @@
           <a:ln/>
           <a:extLst>
             <a:ext uri="{91240B29-F687-4f45-9708-019B960494DF}">
-              <a14:hiddenLine xmlns:a14="http://schemas.microsoft.com/office/drawing/2010/main" xmlns="" w="9525">
+              <a14:hiddenLine xmlns="" xmlns:a14="http://schemas.microsoft.com/office/drawing/2010/main" w="9525">
                 <a:solidFill>
                   <a:srgbClr val="000000"/>
                 </a:solidFill>
@@ -2786,7 +2782,7 @@
           <a:p>
             <a:fld id="{A94AFFAF-92E2-4360-8CE4-B3619D31DC61}" type="datetime1">
               <a:rPr lang="cs-CZ" smtClean="0"/>
-              <a:t>23.04.2023</a:t>
+              <a:t>30.04.2023</a:t>
             </a:fld>
             <a:endParaRPr lang="cs-CZ"/>
           </a:p>
@@ -3129,7 +3125,7 @@
           <a:p>
             <a:fld id="{C14D84F4-1817-41C6-B7B0-41165D09B449}" type="datetime1">
               <a:rPr lang="cs-CZ" smtClean="0"/>
-              <a:t>23.04.2023</a:t>
+              <a:t>30.04.2023</a:t>
             </a:fld>
             <a:endParaRPr lang="cs-CZ"/>
           </a:p>
@@ -3284,7 +3280,7 @@
           <a:ln/>
           <a:extLst>
             <a:ext uri="{91240B29-F687-4f45-9708-019B960494DF}">
-              <a14:hiddenLine xmlns:a14="http://schemas.microsoft.com/office/drawing/2010/main" xmlns="" w="9525">
+              <a14:hiddenLine xmlns="" xmlns:a14="http://schemas.microsoft.com/office/drawing/2010/main" w="9525">
                 <a:solidFill>
                   <a:srgbClr val="000000"/>
                 </a:solidFill>
@@ -3468,7 +3464,7 @@
           <a:p>
             <a:fld id="{21A07C78-ABC5-4FA8-B8D4-3DB076E8D4AE}" type="datetime1">
               <a:rPr lang="cs-CZ" smtClean="0"/>
-              <a:t>23.04.2023</a:t>
+              <a:t>30.04.2023</a:t>
             </a:fld>
             <a:endParaRPr lang="cs-CZ"/>
           </a:p>
@@ -3623,7 +3619,7 @@
           <a:ln/>
           <a:extLst>
             <a:ext uri="{91240B29-F687-4f45-9708-019B960494DF}">
-              <a14:hiddenLine xmlns:a14="http://schemas.microsoft.com/office/drawing/2010/main" xmlns="" w="9525">
+              <a14:hiddenLine xmlns="" xmlns:a14="http://schemas.microsoft.com/office/drawing/2010/main" w="9525">
                 <a:solidFill>
                   <a:srgbClr val="000000"/>
                 </a:solidFill>
@@ -3945,7 +3941,7 @@
           <a:p>
             <a:fld id="{6819A70B-AC27-4F7A-807D-FAB4D54E5FF9}" type="datetime1">
               <a:rPr lang="cs-CZ" smtClean="0"/>
-              <a:t>23.04.2023</a:t>
+              <a:t>30.04.2023</a:t>
             </a:fld>
             <a:endParaRPr lang="cs-CZ"/>
           </a:p>
@@ -4100,7 +4096,7 @@
           <a:ln/>
           <a:extLst>
             <a:ext uri="{91240B29-F687-4f45-9708-019B960494DF}">
-              <a14:hiddenLine xmlns:a14="http://schemas.microsoft.com/office/drawing/2010/main" xmlns="" w="9525">
+              <a14:hiddenLine xmlns="" xmlns:a14="http://schemas.microsoft.com/office/drawing/2010/main" w="9525">
                 <a:solidFill>
                   <a:srgbClr val="000000"/>
                 </a:solidFill>
@@ -4166,7 +4162,7 @@
           <a:p>
             <a:fld id="{2F4C3FD1-3C4E-4D51-8D1C-93D6418E47A2}" type="datetime1">
               <a:rPr lang="cs-CZ" smtClean="0"/>
-              <a:t>23.04.2023</a:t>
+              <a:t>30.04.2023</a:t>
             </a:fld>
             <a:endParaRPr lang="cs-CZ"/>
           </a:p>
@@ -4261,7 +4257,7 @@
           <a:p>
             <a:fld id="{18113286-460C-4812-86A1-A06158B6762B}" type="datetime1">
               <a:rPr lang="cs-CZ" smtClean="0"/>
-              <a:t>23.04.2023</a:t>
+              <a:t>30.04.2023</a:t>
             </a:fld>
             <a:endParaRPr lang="cs-CZ"/>
           </a:p>
@@ -4529,7 +4525,7 @@
           <a:ln/>
           <a:extLst>
             <a:ext uri="{91240B29-F687-4f45-9708-019B960494DF}">
-              <a14:hiddenLine xmlns:a14="http://schemas.microsoft.com/office/drawing/2010/main" xmlns="" w="9525">
+              <a14:hiddenLine xmlns="" xmlns:a14="http://schemas.microsoft.com/office/drawing/2010/main" w="9525">
                 <a:solidFill>
                   <a:srgbClr val="000000"/>
                 </a:solidFill>
@@ -4728,7 +4724,7 @@
           <a:p>
             <a:fld id="{40EC07CD-0E27-4FDC-B6A7-B709C5912368}" type="datetime1">
               <a:rPr lang="cs-CZ" smtClean="0"/>
-              <a:t>23.04.2023</a:t>
+              <a:t>30.04.2023</a:t>
             </a:fld>
             <a:endParaRPr lang="cs-CZ"/>
           </a:p>
@@ -5041,7 +5037,7 @@
           <a:p>
             <a:fld id="{749DDB0F-BE70-47AC-8499-AED8F4C6F7DE}" type="datetime1">
               <a:rPr lang="cs-CZ" smtClean="0"/>
-              <a:t>23.04.2023</a:t>
+              <a:t>30.04.2023</a:t>
             </a:fld>
             <a:endParaRPr lang="cs-CZ"/>
           </a:p>
@@ -5311,7 +5307,7 @@
           <a:p>
             <a:fld id="{C534CBE7-9A0E-41EF-BE59-CBB02378FDA3}" type="datetime1">
               <a:rPr lang="cs-CZ" smtClean="0"/>
-              <a:t>23.04.2023</a:t>
+              <a:t>30.04.2023</a:t>
             </a:fld>
             <a:endParaRPr lang="cs-CZ"/>
           </a:p>
@@ -5911,7 +5907,7 @@
           <a:p>
             <a:fld id="{DCD4A90C-D7B5-48DF-B548-045E8E9681DA}" type="datetime1">
               <a:rPr lang="cs-CZ" smtClean="0"/>
-              <a:t>23.04.2023</a:t>
+              <a:t>30.04.2023</a:t>
             </a:fld>
             <a:endParaRPr lang="cs-CZ" dirty="0"/>
           </a:p>
@@ -5942,6 +5938,10 @@
               <a:rPr lang="cs-CZ" smtClean="0"/>
               <a:t>1</a:t>
             </a:fld>
+            <a:r>
+              <a:rPr lang="en-US" dirty="0"/>
+              <a:t>/15</a:t>
+            </a:r>
             <a:endParaRPr lang="cs-CZ" dirty="0"/>
           </a:p>
         </p:txBody>
@@ -6244,63 +6244,10 @@
           <a:lstStyle/>
           <a:p>
             <a:r>
-              <a:rPr lang="cs-CZ" sz="4000" dirty="0"/>
-              <a:t>Vlastní přínos</a:t>
-            </a:r>
-          </a:p>
-        </p:txBody>
-      </p:sp>
-      <p:sp>
-        <p:nvSpPr>
-          <p:cNvPr id="3" name="Content Placeholder 2">
-            <a:extLst>
-              <a:ext uri="{FF2B5EF4-FFF2-40B4-BE49-F238E27FC236}">
-                <a16:creationId xmlns:a16="http://schemas.microsoft.com/office/drawing/2014/main" id="{00155661-0FAF-5BD1-B8EA-8F9137A3B724}"/>
-              </a:ext>
-            </a:extLst>
-          </p:cNvPr>
-          <p:cNvSpPr>
-            <a:spLocks noGrp="1"/>
-          </p:cNvSpPr>
-          <p:nvPr>
-            <p:ph idx="1"/>
-          </p:nvPr>
-        </p:nvSpPr>
-        <p:spPr/>
-        <p:txBody>
-          <a:bodyPr>
-            <a:normAutofit/>
-          </a:bodyPr>
-          <a:lstStyle/>
-          <a:p>
-            <a:r>
-              <a:rPr lang="cs-CZ" sz="2400" dirty="0"/>
-              <a:t>Implementace ukázkových příkladů</a:t>
-            </a:r>
-          </a:p>
-          <a:p>
-            <a:r>
-              <a:rPr lang="cs-CZ" sz="2400" dirty="0"/>
-              <a:t>Měření výkonu pomocí nástrojů</a:t>
-            </a:r>
-          </a:p>
-          <a:p>
-            <a:r>
-              <a:rPr lang="cs-CZ" sz="2400" dirty="0"/>
-              <a:t>Analýza výsledků</a:t>
-            </a:r>
-          </a:p>
-          <a:p>
-            <a:r>
-              <a:rPr lang="cs-CZ" sz="2400" dirty="0"/>
-              <a:t>Úvaha o výsledcích podpořená profilováním</a:t>
-            </a:r>
-          </a:p>
-          <a:p>
-            <a:r>
-              <a:rPr lang="cs-CZ" sz="2400" dirty="0"/>
-              <a:t>Sestavení sady doporučení</a:t>
-            </a:r>
+              <a:rPr lang="en-US" sz="4000" dirty="0" err="1"/>
+              <a:t>Ukázka</a:t>
+            </a:r>
+            <a:endParaRPr lang="cs-CZ" sz="4000" dirty="0"/>
           </a:p>
         </p:txBody>
       </p:sp>
@@ -6327,7 +6274,7 @@
           <a:p>
             <a:fld id="{D422A4B2-A3A8-46E2-928E-95CC170865B2}" type="datetime1">
               <a:rPr lang="cs-CZ" smtClean="0"/>
-              <a:t>23.04.2023</a:t>
+              <a:t>30.04.2023</a:t>
             </a:fld>
             <a:endParaRPr lang="cs-CZ" dirty="0"/>
           </a:p>
@@ -6358,952 +6305,10 @@
               <a:rPr lang="cs-CZ" smtClean="0"/>
               <a:t>10</a:t>
             </a:fld>
-            <a:endParaRPr lang="cs-CZ" dirty="0"/>
-          </a:p>
-        </p:txBody>
-      </p:sp>
-    </p:spTree>
-    <p:extLst>
-      <p:ext uri="{BB962C8B-B14F-4D97-AF65-F5344CB8AC3E}">
-        <p14:creationId xmlns:p14="http://schemas.microsoft.com/office/powerpoint/2010/main" val="2355381998"/>
-      </p:ext>
-    </p:extLst>
-  </p:cSld>
-  <p:clrMapOvr>
-    <a:masterClrMapping/>
-  </p:clrMapOvr>
-</p:sld>
-</file>
-
-<file path=ppt/slides/slide11.xml><?xml version="1.0" encoding="utf-8"?>
-<p:sld xmlns:a="http://schemas.openxmlformats.org/drawingml/2006/main" xmlns:r="http://schemas.openxmlformats.org/officeDocument/2006/relationships" xmlns:p="http://schemas.openxmlformats.org/presentationml/2006/main">
-  <p:cSld>
-    <p:spTree>
-      <p:nvGrpSpPr>
-        <p:cNvPr id="1" name=""/>
-        <p:cNvGrpSpPr/>
-        <p:nvPr/>
-      </p:nvGrpSpPr>
-      <p:grpSpPr>
-        <a:xfrm>
-          <a:off x="0" y="0"/>
-          <a:ext cx="0" cy="0"/>
-          <a:chOff x="0" y="0"/>
-          <a:chExt cx="0" cy="0"/>
-        </a:xfrm>
-      </p:grpSpPr>
-      <p:sp>
-        <p:nvSpPr>
-          <p:cNvPr id="2" name="Title 1">
-            <a:extLst>
-              <a:ext uri="{FF2B5EF4-FFF2-40B4-BE49-F238E27FC236}">
-                <a16:creationId xmlns:a16="http://schemas.microsoft.com/office/drawing/2014/main" id="{38A438AC-F5C6-6865-EAE7-C53F1DEDBD3A}"/>
-              </a:ext>
-            </a:extLst>
-          </p:cNvPr>
-          <p:cNvSpPr>
-            <a:spLocks noGrp="1"/>
-          </p:cNvSpPr>
-          <p:nvPr>
-            <p:ph type="title"/>
-          </p:nvPr>
-        </p:nvSpPr>
-        <p:spPr/>
-        <p:txBody>
-          <a:bodyPr/>
-          <a:lstStyle/>
-          <a:p>
-            <a:r>
-              <a:rPr lang="cs-CZ" sz="4000" dirty="0"/>
-              <a:t>Použité technologie</a:t>
-            </a:r>
-          </a:p>
-        </p:txBody>
-      </p:sp>
-      <p:sp>
-        <p:nvSpPr>
-          <p:cNvPr id="3" name="Content Placeholder 2">
-            <a:extLst>
-              <a:ext uri="{FF2B5EF4-FFF2-40B4-BE49-F238E27FC236}">
-                <a16:creationId xmlns:a16="http://schemas.microsoft.com/office/drawing/2014/main" id="{00155661-0FAF-5BD1-B8EA-8F9137A3B724}"/>
-              </a:ext>
-            </a:extLst>
-          </p:cNvPr>
-          <p:cNvSpPr>
-            <a:spLocks noGrp="1"/>
-          </p:cNvSpPr>
-          <p:nvPr>
-            <p:ph idx="1"/>
-          </p:nvPr>
-        </p:nvSpPr>
-        <p:spPr/>
-        <p:txBody>
-          <a:bodyPr>
-            <a:normAutofit/>
-          </a:bodyPr>
-          <a:lstStyle/>
-          <a:p>
-            <a:r>
-              <a:rPr lang="cs-CZ" sz="2400" dirty="0"/>
-              <a:t>Programovací jazyk C++</a:t>
-            </a:r>
-            <a:r>
-              <a:rPr lang="en-US" sz="2400" dirty="0"/>
-              <a:t> (GCC, Clang a MSVC)</a:t>
-            </a:r>
-            <a:endParaRPr lang="cs-CZ" sz="2400" dirty="0"/>
-          </a:p>
-          <a:p>
-            <a:r>
-              <a:rPr lang="cs-CZ" sz="2400" dirty="0"/>
-              <a:t>Časování pomocí Google Benchmark</a:t>
-            </a:r>
-          </a:p>
-          <a:p>
-            <a:r>
-              <a:rPr lang="cs-CZ" sz="2400" dirty="0"/>
-              <a:t>Vzorkovací </a:t>
-            </a:r>
-            <a:r>
-              <a:rPr lang="cs-CZ" sz="2400" dirty="0" err="1"/>
-              <a:t>profiler</a:t>
-            </a:r>
-            <a:r>
-              <a:rPr lang="cs-CZ" sz="2400" dirty="0"/>
-              <a:t> Intel </a:t>
-            </a:r>
-            <a:r>
-              <a:rPr lang="cs-CZ" sz="2400" dirty="0" err="1"/>
-              <a:t>vTune</a:t>
-            </a:r>
-            <a:endParaRPr lang="cs-CZ" sz="2400" dirty="0"/>
-          </a:p>
-          <a:p>
-            <a:r>
-              <a:rPr lang="cs-CZ" sz="2400" dirty="0"/>
-              <a:t>Instrumentační </a:t>
-            </a:r>
-            <a:r>
-              <a:rPr lang="cs-CZ" sz="2400" dirty="0" err="1"/>
-              <a:t>profiler</a:t>
-            </a:r>
-            <a:r>
-              <a:rPr lang="cs-CZ" sz="2400" dirty="0"/>
-              <a:t> Tracy</a:t>
-            </a:r>
-          </a:p>
-        </p:txBody>
-      </p:sp>
-      <p:sp>
-        <p:nvSpPr>
-          <p:cNvPr id="4" name="Date Placeholder 3">
-            <a:extLst>
-              <a:ext uri="{FF2B5EF4-FFF2-40B4-BE49-F238E27FC236}">
-                <a16:creationId xmlns:a16="http://schemas.microsoft.com/office/drawing/2014/main" id="{2B553397-37DB-18D7-14A8-7FC21DE5A325}"/>
-              </a:ext>
-            </a:extLst>
-          </p:cNvPr>
-          <p:cNvSpPr>
-            <a:spLocks noGrp="1"/>
-          </p:cNvSpPr>
-          <p:nvPr>
-            <p:ph type="dt" sz="half" idx="10"/>
-          </p:nvPr>
-        </p:nvSpPr>
-        <p:spPr/>
-        <p:txBody>
-          <a:bodyPr/>
-          <a:lstStyle/>
-          <a:p>
-            <a:fld id="{D422A4B2-A3A8-46E2-928E-95CC170865B2}" type="datetime1">
-              <a:rPr lang="cs-CZ" smtClean="0"/>
-              <a:t>23.04.2023</a:t>
-            </a:fld>
-            <a:endParaRPr lang="cs-CZ" dirty="0"/>
-          </a:p>
-        </p:txBody>
-      </p:sp>
-      <p:sp>
-        <p:nvSpPr>
-          <p:cNvPr id="5" name="Slide Number Placeholder 4">
-            <a:extLst>
-              <a:ext uri="{FF2B5EF4-FFF2-40B4-BE49-F238E27FC236}">
-                <a16:creationId xmlns:a16="http://schemas.microsoft.com/office/drawing/2014/main" id="{544BDC0D-C63F-0E37-FD0C-324FA6CB95FD}"/>
-              </a:ext>
-            </a:extLst>
-          </p:cNvPr>
-          <p:cNvSpPr>
-            <a:spLocks noGrp="1"/>
-          </p:cNvSpPr>
-          <p:nvPr>
-            <p:ph type="sldNum" sz="quarter" idx="12"/>
-          </p:nvPr>
-        </p:nvSpPr>
-        <p:spPr/>
-        <p:txBody>
-          <a:bodyPr/>
-          <a:lstStyle/>
-          <a:p>
-            <a:fld id="{1BA6BF28-8B0B-4A51-9E07-225045E39492}" type="slidenum">
-              <a:rPr lang="cs-CZ" smtClean="0"/>
-              <a:t>11</a:t>
-            </a:fld>
-            <a:endParaRPr lang="cs-CZ" dirty="0"/>
-          </a:p>
-        </p:txBody>
-      </p:sp>
-    </p:spTree>
-    <p:extLst>
-      <p:ext uri="{BB962C8B-B14F-4D97-AF65-F5344CB8AC3E}">
-        <p14:creationId xmlns:p14="http://schemas.microsoft.com/office/powerpoint/2010/main" val="2310293848"/>
-      </p:ext>
-    </p:extLst>
-  </p:cSld>
-  <p:clrMapOvr>
-    <a:masterClrMapping/>
-  </p:clrMapOvr>
-</p:sld>
-</file>
-
-<file path=ppt/slides/slide12.xml><?xml version="1.0" encoding="utf-8"?>
-<p:sld xmlns:a="http://schemas.openxmlformats.org/drawingml/2006/main" xmlns:r="http://schemas.openxmlformats.org/officeDocument/2006/relationships" xmlns:p="http://schemas.openxmlformats.org/presentationml/2006/main">
-  <p:cSld>
-    <p:spTree>
-      <p:nvGrpSpPr>
-        <p:cNvPr id="1" name=""/>
-        <p:cNvGrpSpPr/>
-        <p:nvPr/>
-      </p:nvGrpSpPr>
-      <p:grpSpPr>
-        <a:xfrm>
-          <a:off x="0" y="0"/>
-          <a:ext cx="0" cy="0"/>
-          <a:chOff x="0" y="0"/>
-          <a:chExt cx="0" cy="0"/>
-        </a:xfrm>
-      </p:grpSpPr>
-      <p:sp>
-        <p:nvSpPr>
-          <p:cNvPr id="2" name="Title 1">
-            <a:extLst>
-              <a:ext uri="{FF2B5EF4-FFF2-40B4-BE49-F238E27FC236}">
-                <a16:creationId xmlns:a16="http://schemas.microsoft.com/office/drawing/2014/main" id="{38A438AC-F5C6-6865-EAE7-C53F1DEDBD3A}"/>
-              </a:ext>
-            </a:extLst>
-          </p:cNvPr>
-          <p:cNvSpPr>
-            <a:spLocks noGrp="1"/>
-          </p:cNvSpPr>
-          <p:nvPr>
-            <p:ph type="title"/>
-          </p:nvPr>
-        </p:nvSpPr>
-        <p:spPr/>
-        <p:txBody>
-          <a:bodyPr/>
-          <a:lstStyle/>
-          <a:p>
-            <a:r>
-              <a:rPr lang="cs-CZ" sz="4000" dirty="0"/>
-              <a:t>Výsledky</a:t>
-            </a:r>
-          </a:p>
-        </p:txBody>
-      </p:sp>
-      <p:sp>
-        <p:nvSpPr>
-          <p:cNvPr id="4" name="Date Placeholder 3">
-            <a:extLst>
-              <a:ext uri="{FF2B5EF4-FFF2-40B4-BE49-F238E27FC236}">
-                <a16:creationId xmlns:a16="http://schemas.microsoft.com/office/drawing/2014/main" id="{2B553397-37DB-18D7-14A8-7FC21DE5A325}"/>
-              </a:ext>
-            </a:extLst>
-          </p:cNvPr>
-          <p:cNvSpPr>
-            <a:spLocks noGrp="1"/>
-          </p:cNvSpPr>
-          <p:nvPr>
-            <p:ph type="dt" sz="half" idx="10"/>
-          </p:nvPr>
-        </p:nvSpPr>
-        <p:spPr/>
-        <p:txBody>
-          <a:bodyPr/>
-          <a:lstStyle/>
-          <a:p>
-            <a:fld id="{D422A4B2-A3A8-46E2-928E-95CC170865B2}" type="datetime1">
-              <a:rPr lang="cs-CZ" smtClean="0"/>
-              <a:t>23.04.2023</a:t>
-            </a:fld>
-            <a:endParaRPr lang="cs-CZ" dirty="0"/>
-          </a:p>
-        </p:txBody>
-      </p:sp>
-      <p:sp>
-        <p:nvSpPr>
-          <p:cNvPr id="5" name="Slide Number Placeholder 4">
-            <a:extLst>
-              <a:ext uri="{FF2B5EF4-FFF2-40B4-BE49-F238E27FC236}">
-                <a16:creationId xmlns:a16="http://schemas.microsoft.com/office/drawing/2014/main" id="{544BDC0D-C63F-0E37-FD0C-324FA6CB95FD}"/>
-              </a:ext>
-            </a:extLst>
-          </p:cNvPr>
-          <p:cNvSpPr>
-            <a:spLocks noGrp="1"/>
-          </p:cNvSpPr>
-          <p:nvPr>
-            <p:ph type="sldNum" sz="quarter" idx="12"/>
-          </p:nvPr>
-        </p:nvSpPr>
-        <p:spPr/>
-        <p:txBody>
-          <a:bodyPr/>
-          <a:lstStyle/>
-          <a:p>
-            <a:fld id="{1BA6BF28-8B0B-4A51-9E07-225045E39492}" type="slidenum">
-              <a:rPr lang="cs-CZ" smtClean="0"/>
-              <a:t>12</a:t>
-            </a:fld>
-            <a:endParaRPr lang="cs-CZ" dirty="0"/>
-          </a:p>
-        </p:txBody>
-      </p:sp>
-      <p:pic>
-        <p:nvPicPr>
-          <p:cNvPr id="11" name="Content Placeholder 10" descr="Graphical user interface, text, application&#10;&#10;Description automatically generated">
-            <a:extLst>
-              <a:ext uri="{FF2B5EF4-FFF2-40B4-BE49-F238E27FC236}">
-                <a16:creationId xmlns:a16="http://schemas.microsoft.com/office/drawing/2014/main" id="{798BAC9F-5710-8EC2-6944-2057F258F5A8}"/>
-              </a:ext>
-            </a:extLst>
-          </p:cNvPr>
-          <p:cNvPicPr>
-            <a:picLocks noGrp="1" noChangeAspect="1"/>
-          </p:cNvPicPr>
-          <p:nvPr>
-            <p:ph idx="1"/>
-          </p:nvPr>
-        </p:nvPicPr>
-        <p:blipFill>
-          <a:blip r:embed="rId2">
-            <a:extLst>
-              <a:ext uri="{28A0092B-C50C-407E-A947-70E740481C1C}">
-                <a14:useLocalDpi xmlns:a14="http://schemas.microsoft.com/office/drawing/2010/main" val="0"/>
-              </a:ext>
-            </a:extLst>
-          </a:blip>
-          <a:stretch>
-            <a:fillRect/>
-          </a:stretch>
-        </p:blipFill>
-        <p:spPr>
-          <a:xfrm>
-            <a:off x="2614793" y="2095546"/>
-            <a:ext cx="6962414" cy="3403315"/>
-          </a:xfrm>
-        </p:spPr>
-      </p:pic>
-      <p:sp>
-        <p:nvSpPr>
-          <p:cNvPr id="12" name="TextBox 11">
-            <a:extLst>
-              <a:ext uri="{FF2B5EF4-FFF2-40B4-BE49-F238E27FC236}">
-                <a16:creationId xmlns:a16="http://schemas.microsoft.com/office/drawing/2014/main" id="{697A0AB9-D9BA-7CB2-B7CC-43FE2682301F}"/>
-              </a:ext>
-            </a:extLst>
-          </p:cNvPr>
-          <p:cNvSpPr txBox="1"/>
-          <p:nvPr/>
-        </p:nvSpPr>
-        <p:spPr>
-          <a:xfrm>
-            <a:off x="3509574" y="5498861"/>
-            <a:ext cx="5172849" cy="369332"/>
-          </a:xfrm>
-          <a:prstGeom prst="rect">
-            <a:avLst/>
-          </a:prstGeom>
-          <a:noFill/>
-        </p:spPr>
-        <p:txBody>
-          <a:bodyPr wrap="square" rtlCol="0">
-            <a:spAutoFit/>
-          </a:bodyPr>
-          <a:lstStyle/>
-          <a:p>
-            <a:r>
-              <a:rPr lang="cs-CZ" dirty="0"/>
-              <a:t>Obr. 1: Ukázka OOP přístupu</a:t>
-            </a:r>
             <a:r>
               <a:rPr lang="en-US" dirty="0"/>
-              <a:t>. [</a:t>
-            </a:r>
-            <a:r>
-              <a:rPr lang="en-US" dirty="0" err="1"/>
-              <a:t>Zdroj</a:t>
-            </a:r>
-            <a:r>
-              <a:rPr lang="en-US" dirty="0"/>
-              <a:t> </a:t>
-            </a:r>
-            <a:r>
-              <a:rPr lang="en-US" dirty="0" err="1"/>
-              <a:t>vlastní</a:t>
-            </a:r>
-            <a:r>
-              <a:rPr lang="en-US" dirty="0"/>
-              <a:t>]</a:t>
-            </a:r>
-            <a:endParaRPr lang="cs-CZ" dirty="0"/>
-          </a:p>
-        </p:txBody>
-      </p:sp>
-    </p:spTree>
-    <p:extLst>
-      <p:ext uri="{BB962C8B-B14F-4D97-AF65-F5344CB8AC3E}">
-        <p14:creationId xmlns:p14="http://schemas.microsoft.com/office/powerpoint/2010/main" val="4122631926"/>
-      </p:ext>
-    </p:extLst>
-  </p:cSld>
-  <p:clrMapOvr>
-    <a:masterClrMapping/>
-  </p:clrMapOvr>
-</p:sld>
-</file>
-
-<file path=ppt/slides/slide13.xml><?xml version="1.0" encoding="utf-8"?>
-<p:sld xmlns:a="http://schemas.openxmlformats.org/drawingml/2006/main" xmlns:r="http://schemas.openxmlformats.org/officeDocument/2006/relationships" xmlns:p="http://schemas.openxmlformats.org/presentationml/2006/main">
-  <p:cSld>
-    <p:spTree>
-      <p:nvGrpSpPr>
-        <p:cNvPr id="1" name=""/>
-        <p:cNvGrpSpPr/>
-        <p:nvPr/>
-      </p:nvGrpSpPr>
-      <p:grpSpPr>
-        <a:xfrm>
-          <a:off x="0" y="0"/>
-          <a:ext cx="0" cy="0"/>
-          <a:chOff x="0" y="0"/>
-          <a:chExt cx="0" cy="0"/>
-        </a:xfrm>
-      </p:grpSpPr>
-      <p:sp>
-        <p:nvSpPr>
-          <p:cNvPr id="2" name="Title 1">
-            <a:extLst>
-              <a:ext uri="{FF2B5EF4-FFF2-40B4-BE49-F238E27FC236}">
-                <a16:creationId xmlns:a16="http://schemas.microsoft.com/office/drawing/2014/main" id="{38A438AC-F5C6-6865-EAE7-C53F1DEDBD3A}"/>
-              </a:ext>
-            </a:extLst>
-          </p:cNvPr>
-          <p:cNvSpPr>
-            <a:spLocks noGrp="1"/>
-          </p:cNvSpPr>
-          <p:nvPr>
-            <p:ph type="title"/>
-          </p:nvPr>
-        </p:nvSpPr>
-        <p:spPr/>
-        <p:txBody>
-          <a:bodyPr/>
-          <a:lstStyle/>
-          <a:p>
-            <a:r>
-              <a:rPr lang="cs-CZ" sz="4000" dirty="0"/>
-              <a:t>Výsledky</a:t>
-            </a:r>
-          </a:p>
-        </p:txBody>
-      </p:sp>
-      <p:sp>
-        <p:nvSpPr>
-          <p:cNvPr id="4" name="Date Placeholder 3">
-            <a:extLst>
-              <a:ext uri="{FF2B5EF4-FFF2-40B4-BE49-F238E27FC236}">
-                <a16:creationId xmlns:a16="http://schemas.microsoft.com/office/drawing/2014/main" id="{2B553397-37DB-18D7-14A8-7FC21DE5A325}"/>
-              </a:ext>
-            </a:extLst>
-          </p:cNvPr>
-          <p:cNvSpPr>
-            <a:spLocks noGrp="1"/>
-          </p:cNvSpPr>
-          <p:nvPr>
-            <p:ph type="dt" sz="half" idx="10"/>
-          </p:nvPr>
-        </p:nvSpPr>
-        <p:spPr/>
-        <p:txBody>
-          <a:bodyPr/>
-          <a:lstStyle/>
-          <a:p>
-            <a:fld id="{D422A4B2-A3A8-46E2-928E-95CC170865B2}" type="datetime1">
-              <a:rPr lang="cs-CZ" smtClean="0"/>
-              <a:t>23.04.2023</a:t>
-            </a:fld>
-            <a:endParaRPr lang="cs-CZ" dirty="0"/>
-          </a:p>
-        </p:txBody>
-      </p:sp>
-      <p:sp>
-        <p:nvSpPr>
-          <p:cNvPr id="5" name="Slide Number Placeholder 4">
-            <a:extLst>
-              <a:ext uri="{FF2B5EF4-FFF2-40B4-BE49-F238E27FC236}">
-                <a16:creationId xmlns:a16="http://schemas.microsoft.com/office/drawing/2014/main" id="{544BDC0D-C63F-0E37-FD0C-324FA6CB95FD}"/>
-              </a:ext>
-            </a:extLst>
-          </p:cNvPr>
-          <p:cNvSpPr>
-            <a:spLocks noGrp="1"/>
-          </p:cNvSpPr>
-          <p:nvPr>
-            <p:ph type="sldNum" sz="quarter" idx="12"/>
-          </p:nvPr>
-        </p:nvSpPr>
-        <p:spPr/>
-        <p:txBody>
-          <a:bodyPr/>
-          <a:lstStyle/>
-          <a:p>
-            <a:fld id="{1BA6BF28-8B0B-4A51-9E07-225045E39492}" type="slidenum">
-              <a:rPr lang="cs-CZ" smtClean="0"/>
-              <a:t>13</a:t>
-            </a:fld>
-            <a:endParaRPr lang="cs-CZ" dirty="0"/>
-          </a:p>
-        </p:txBody>
-      </p:sp>
-      <p:sp>
-        <p:nvSpPr>
-          <p:cNvPr id="12" name="TextBox 11">
-            <a:extLst>
-              <a:ext uri="{FF2B5EF4-FFF2-40B4-BE49-F238E27FC236}">
-                <a16:creationId xmlns:a16="http://schemas.microsoft.com/office/drawing/2014/main" id="{697A0AB9-D9BA-7CB2-B7CC-43FE2682301F}"/>
-              </a:ext>
-            </a:extLst>
-          </p:cNvPr>
-          <p:cNvSpPr txBox="1"/>
-          <p:nvPr/>
-        </p:nvSpPr>
-        <p:spPr>
-          <a:xfrm>
-            <a:off x="3107434" y="5419344"/>
-            <a:ext cx="5977129" cy="369332"/>
-          </a:xfrm>
-          <a:prstGeom prst="rect">
-            <a:avLst/>
-          </a:prstGeom>
-          <a:noFill/>
-        </p:spPr>
-        <p:txBody>
-          <a:bodyPr wrap="square" rtlCol="0">
-            <a:spAutoFit/>
-          </a:bodyPr>
-          <a:lstStyle/>
-          <a:p>
-            <a:r>
-              <a:rPr lang="cs-CZ" dirty="0"/>
-              <a:t>Obr. 2: Rozložení dat v </a:t>
-            </a:r>
-            <a:r>
-              <a:rPr lang="cs-CZ" dirty="0" err="1"/>
-              <a:t>cache</a:t>
-            </a:r>
-            <a:r>
-              <a:rPr lang="cs-CZ" dirty="0"/>
-              <a:t> OOP</a:t>
-            </a:r>
-            <a:r>
-              <a:rPr lang="en-US" dirty="0"/>
-              <a:t>. [</a:t>
-            </a:r>
-            <a:r>
-              <a:rPr lang="en-US" dirty="0" err="1"/>
-              <a:t>Zdroj</a:t>
-            </a:r>
-            <a:r>
-              <a:rPr lang="en-US" dirty="0"/>
-              <a:t> </a:t>
-            </a:r>
-            <a:r>
-              <a:rPr lang="en-US" dirty="0" err="1"/>
-              <a:t>vlastní</a:t>
-            </a:r>
-            <a:r>
-              <a:rPr lang="en-US" dirty="0"/>
-              <a:t>]</a:t>
-            </a:r>
-            <a:endParaRPr lang="cs-CZ" dirty="0"/>
-          </a:p>
-        </p:txBody>
-      </p:sp>
-      <p:pic>
-        <p:nvPicPr>
-          <p:cNvPr id="8" name="Content Placeholder 7" descr="Table&#10;&#10;Description automatically generated">
-            <a:extLst>
-              <a:ext uri="{FF2B5EF4-FFF2-40B4-BE49-F238E27FC236}">
-                <a16:creationId xmlns:a16="http://schemas.microsoft.com/office/drawing/2014/main" id="{089A361B-461A-A6EB-1354-B783C4F38122}"/>
-              </a:ext>
-            </a:extLst>
-          </p:cNvPr>
-          <p:cNvPicPr>
-            <a:picLocks noGrp="1" noChangeAspect="1"/>
-          </p:cNvPicPr>
-          <p:nvPr>
-            <p:ph idx="1"/>
-          </p:nvPr>
-        </p:nvPicPr>
-        <p:blipFill>
-          <a:blip r:embed="rId2">
-            <a:extLst>
-              <a:ext uri="{28A0092B-C50C-407E-A947-70E740481C1C}">
-                <a14:useLocalDpi xmlns:a14="http://schemas.microsoft.com/office/drawing/2010/main" val="0"/>
-              </a:ext>
-            </a:extLst>
-          </a:blip>
-          <a:stretch>
-            <a:fillRect/>
-          </a:stretch>
-        </p:blipFill>
-        <p:spPr>
-          <a:xfrm>
-            <a:off x="2675528" y="2380860"/>
-            <a:ext cx="6840944" cy="2982711"/>
-          </a:xfrm>
-        </p:spPr>
-      </p:pic>
-    </p:spTree>
-    <p:extLst>
-      <p:ext uri="{BB962C8B-B14F-4D97-AF65-F5344CB8AC3E}">
-        <p14:creationId xmlns:p14="http://schemas.microsoft.com/office/powerpoint/2010/main" val="412085139"/>
-      </p:ext>
-    </p:extLst>
-  </p:cSld>
-  <p:clrMapOvr>
-    <a:masterClrMapping/>
-  </p:clrMapOvr>
-</p:sld>
-</file>
-
-<file path=ppt/slides/slide14.xml><?xml version="1.0" encoding="utf-8"?>
-<p:sld xmlns:a="http://schemas.openxmlformats.org/drawingml/2006/main" xmlns:r="http://schemas.openxmlformats.org/officeDocument/2006/relationships" xmlns:p="http://schemas.openxmlformats.org/presentationml/2006/main">
-  <p:cSld>
-    <p:spTree>
-      <p:nvGrpSpPr>
-        <p:cNvPr id="1" name=""/>
-        <p:cNvGrpSpPr/>
-        <p:nvPr/>
-      </p:nvGrpSpPr>
-      <p:grpSpPr>
-        <a:xfrm>
-          <a:off x="0" y="0"/>
-          <a:ext cx="0" cy="0"/>
-          <a:chOff x="0" y="0"/>
-          <a:chExt cx="0" cy="0"/>
-        </a:xfrm>
-      </p:grpSpPr>
-      <p:sp>
-        <p:nvSpPr>
-          <p:cNvPr id="2" name="Title 1">
-            <a:extLst>
-              <a:ext uri="{FF2B5EF4-FFF2-40B4-BE49-F238E27FC236}">
-                <a16:creationId xmlns:a16="http://schemas.microsoft.com/office/drawing/2014/main" id="{38A438AC-F5C6-6865-EAE7-C53F1DEDBD3A}"/>
-              </a:ext>
-            </a:extLst>
-          </p:cNvPr>
-          <p:cNvSpPr>
-            <a:spLocks noGrp="1"/>
-          </p:cNvSpPr>
-          <p:nvPr>
-            <p:ph type="title"/>
-          </p:nvPr>
-        </p:nvSpPr>
-        <p:spPr/>
-        <p:txBody>
-          <a:bodyPr/>
-          <a:lstStyle/>
-          <a:p>
-            <a:r>
-              <a:rPr lang="cs-CZ" sz="4000" dirty="0"/>
-              <a:t>Výsledky</a:t>
-            </a:r>
-          </a:p>
-        </p:txBody>
-      </p:sp>
-      <p:sp>
-        <p:nvSpPr>
-          <p:cNvPr id="4" name="Date Placeholder 3">
-            <a:extLst>
-              <a:ext uri="{FF2B5EF4-FFF2-40B4-BE49-F238E27FC236}">
-                <a16:creationId xmlns:a16="http://schemas.microsoft.com/office/drawing/2014/main" id="{2B553397-37DB-18D7-14A8-7FC21DE5A325}"/>
-              </a:ext>
-            </a:extLst>
-          </p:cNvPr>
-          <p:cNvSpPr>
-            <a:spLocks noGrp="1"/>
-          </p:cNvSpPr>
-          <p:nvPr>
-            <p:ph type="dt" sz="half" idx="10"/>
-          </p:nvPr>
-        </p:nvSpPr>
-        <p:spPr/>
-        <p:txBody>
-          <a:bodyPr/>
-          <a:lstStyle/>
-          <a:p>
-            <a:fld id="{D422A4B2-A3A8-46E2-928E-95CC170865B2}" type="datetime1">
-              <a:rPr lang="cs-CZ" smtClean="0"/>
-              <a:t>23.04.2023</a:t>
-            </a:fld>
-            <a:endParaRPr lang="cs-CZ" dirty="0"/>
-          </a:p>
-        </p:txBody>
-      </p:sp>
-      <p:sp>
-        <p:nvSpPr>
-          <p:cNvPr id="5" name="Slide Number Placeholder 4">
-            <a:extLst>
-              <a:ext uri="{FF2B5EF4-FFF2-40B4-BE49-F238E27FC236}">
-                <a16:creationId xmlns:a16="http://schemas.microsoft.com/office/drawing/2014/main" id="{544BDC0D-C63F-0E37-FD0C-324FA6CB95FD}"/>
-              </a:ext>
-            </a:extLst>
-          </p:cNvPr>
-          <p:cNvSpPr>
-            <a:spLocks noGrp="1"/>
-          </p:cNvSpPr>
-          <p:nvPr>
-            <p:ph type="sldNum" sz="quarter" idx="12"/>
-          </p:nvPr>
-        </p:nvSpPr>
-        <p:spPr/>
-        <p:txBody>
-          <a:bodyPr/>
-          <a:lstStyle/>
-          <a:p>
-            <a:fld id="{1BA6BF28-8B0B-4A51-9E07-225045E39492}" type="slidenum">
-              <a:rPr lang="cs-CZ" smtClean="0"/>
-              <a:t>14</a:t>
-            </a:fld>
-            <a:endParaRPr lang="cs-CZ" dirty="0"/>
-          </a:p>
-        </p:txBody>
-      </p:sp>
-      <p:sp>
-        <p:nvSpPr>
-          <p:cNvPr id="12" name="TextBox 11">
-            <a:extLst>
-              <a:ext uri="{FF2B5EF4-FFF2-40B4-BE49-F238E27FC236}">
-                <a16:creationId xmlns:a16="http://schemas.microsoft.com/office/drawing/2014/main" id="{697A0AB9-D9BA-7CB2-B7CC-43FE2682301F}"/>
-              </a:ext>
-            </a:extLst>
-          </p:cNvPr>
-          <p:cNvSpPr txBox="1"/>
-          <p:nvPr/>
-        </p:nvSpPr>
-        <p:spPr>
-          <a:xfrm>
-            <a:off x="3450495" y="6467522"/>
-            <a:ext cx="5291003" cy="369332"/>
-          </a:xfrm>
-          <a:prstGeom prst="rect">
-            <a:avLst/>
-          </a:prstGeom>
-          <a:noFill/>
-        </p:spPr>
-        <p:txBody>
-          <a:bodyPr wrap="square" rtlCol="0">
-            <a:spAutoFit/>
-          </a:bodyPr>
-          <a:lstStyle/>
-          <a:p>
-            <a:r>
-              <a:rPr lang="cs-CZ" dirty="0"/>
-              <a:t>Obr. </a:t>
-            </a:r>
-            <a:r>
-              <a:rPr lang="en-US" dirty="0"/>
-              <a:t>3</a:t>
-            </a:r>
-            <a:r>
-              <a:rPr lang="cs-CZ" dirty="0"/>
-              <a:t>: Ukázka </a:t>
-            </a:r>
-            <a:r>
-              <a:rPr lang="en-US" dirty="0"/>
-              <a:t>D</a:t>
-            </a:r>
-            <a:r>
-              <a:rPr lang="cs-CZ" dirty="0"/>
-              <a:t>OP přístupu</a:t>
-            </a:r>
-            <a:r>
-              <a:rPr lang="en-US" dirty="0"/>
-              <a:t>. [</a:t>
-            </a:r>
-            <a:r>
-              <a:rPr lang="en-US" dirty="0" err="1"/>
-              <a:t>Zdroj</a:t>
-            </a:r>
-            <a:r>
-              <a:rPr lang="en-US" dirty="0"/>
-              <a:t> </a:t>
-            </a:r>
-            <a:r>
-              <a:rPr lang="en-US" dirty="0" err="1"/>
-              <a:t>vlastní</a:t>
-            </a:r>
-            <a:r>
-              <a:rPr lang="en-US" dirty="0"/>
-              <a:t>]</a:t>
-            </a:r>
-            <a:endParaRPr lang="cs-CZ" dirty="0"/>
-          </a:p>
-        </p:txBody>
-      </p:sp>
-      <p:pic>
-        <p:nvPicPr>
-          <p:cNvPr id="11" name="Picture 10">
-            <a:extLst>
-              <a:ext uri="{FF2B5EF4-FFF2-40B4-BE49-F238E27FC236}">
-                <a16:creationId xmlns:a16="http://schemas.microsoft.com/office/drawing/2014/main" id="{26EED16B-FD23-D155-17EA-30AF2F7D1FDB}"/>
-              </a:ext>
-            </a:extLst>
-          </p:cNvPr>
-          <p:cNvPicPr>
-            <a:picLocks noChangeAspect="1"/>
-          </p:cNvPicPr>
-          <p:nvPr/>
-        </p:nvPicPr>
-        <p:blipFill>
-          <a:blip r:embed="rId2"/>
-          <a:stretch>
-            <a:fillRect/>
-          </a:stretch>
-        </p:blipFill>
-        <p:spPr>
-          <a:xfrm>
-            <a:off x="2690810" y="2112073"/>
-            <a:ext cx="6810375" cy="4352925"/>
-          </a:xfrm>
-          <a:prstGeom prst="rect">
-            <a:avLst/>
-          </a:prstGeom>
-        </p:spPr>
-      </p:pic>
-    </p:spTree>
-    <p:extLst>
-      <p:ext uri="{BB962C8B-B14F-4D97-AF65-F5344CB8AC3E}">
-        <p14:creationId xmlns:p14="http://schemas.microsoft.com/office/powerpoint/2010/main" val="365415222"/>
-      </p:ext>
-    </p:extLst>
-  </p:cSld>
-  <p:clrMapOvr>
-    <a:masterClrMapping/>
-  </p:clrMapOvr>
-</p:sld>
-</file>
-
-<file path=ppt/slides/slide15.xml><?xml version="1.0" encoding="utf-8"?>
-<p:sld xmlns:a="http://schemas.openxmlformats.org/drawingml/2006/main" xmlns:r="http://schemas.openxmlformats.org/officeDocument/2006/relationships" xmlns:p="http://schemas.openxmlformats.org/presentationml/2006/main">
-  <p:cSld>
-    <p:spTree>
-      <p:nvGrpSpPr>
-        <p:cNvPr id="1" name=""/>
-        <p:cNvGrpSpPr/>
-        <p:nvPr/>
-      </p:nvGrpSpPr>
-      <p:grpSpPr>
-        <a:xfrm>
-          <a:off x="0" y="0"/>
-          <a:ext cx="0" cy="0"/>
-          <a:chOff x="0" y="0"/>
-          <a:chExt cx="0" cy="0"/>
-        </a:xfrm>
-      </p:grpSpPr>
-      <p:sp>
-        <p:nvSpPr>
-          <p:cNvPr id="2" name="Title 1">
-            <a:extLst>
-              <a:ext uri="{FF2B5EF4-FFF2-40B4-BE49-F238E27FC236}">
-                <a16:creationId xmlns:a16="http://schemas.microsoft.com/office/drawing/2014/main" id="{38A438AC-F5C6-6865-EAE7-C53F1DEDBD3A}"/>
-              </a:ext>
-            </a:extLst>
-          </p:cNvPr>
-          <p:cNvSpPr>
-            <a:spLocks noGrp="1"/>
-          </p:cNvSpPr>
-          <p:nvPr>
-            <p:ph type="title"/>
-          </p:nvPr>
-        </p:nvSpPr>
-        <p:spPr/>
-        <p:txBody>
-          <a:bodyPr/>
-          <a:lstStyle/>
-          <a:p>
-            <a:r>
-              <a:rPr lang="cs-CZ" sz="4000" dirty="0"/>
-              <a:t>Výsledky</a:t>
-            </a:r>
-          </a:p>
-        </p:txBody>
-      </p:sp>
-      <p:sp>
-        <p:nvSpPr>
-          <p:cNvPr id="4" name="Date Placeholder 3">
-            <a:extLst>
-              <a:ext uri="{FF2B5EF4-FFF2-40B4-BE49-F238E27FC236}">
-                <a16:creationId xmlns:a16="http://schemas.microsoft.com/office/drawing/2014/main" id="{2B553397-37DB-18D7-14A8-7FC21DE5A325}"/>
-              </a:ext>
-            </a:extLst>
-          </p:cNvPr>
-          <p:cNvSpPr>
-            <a:spLocks noGrp="1"/>
-          </p:cNvSpPr>
-          <p:nvPr>
-            <p:ph type="dt" sz="half" idx="10"/>
-          </p:nvPr>
-        </p:nvSpPr>
-        <p:spPr/>
-        <p:txBody>
-          <a:bodyPr/>
-          <a:lstStyle/>
-          <a:p>
-            <a:fld id="{D422A4B2-A3A8-46E2-928E-95CC170865B2}" type="datetime1">
-              <a:rPr lang="cs-CZ" smtClean="0"/>
-              <a:t>23.04.2023</a:t>
-            </a:fld>
-            <a:endParaRPr lang="cs-CZ" dirty="0"/>
-          </a:p>
-        </p:txBody>
-      </p:sp>
-      <p:sp>
-        <p:nvSpPr>
-          <p:cNvPr id="5" name="Slide Number Placeholder 4">
-            <a:extLst>
-              <a:ext uri="{FF2B5EF4-FFF2-40B4-BE49-F238E27FC236}">
-                <a16:creationId xmlns:a16="http://schemas.microsoft.com/office/drawing/2014/main" id="{544BDC0D-C63F-0E37-FD0C-324FA6CB95FD}"/>
-              </a:ext>
-            </a:extLst>
-          </p:cNvPr>
-          <p:cNvSpPr>
-            <a:spLocks noGrp="1"/>
-          </p:cNvSpPr>
-          <p:nvPr>
-            <p:ph type="sldNum" sz="quarter" idx="12"/>
-          </p:nvPr>
-        </p:nvSpPr>
-        <p:spPr/>
-        <p:txBody>
-          <a:bodyPr/>
-          <a:lstStyle/>
-          <a:p>
-            <a:fld id="{1BA6BF28-8B0B-4A51-9E07-225045E39492}" type="slidenum">
-              <a:rPr lang="cs-CZ" smtClean="0"/>
-              <a:t>15</a:t>
-            </a:fld>
+              <a:t> /15</a:t>
+            </a:r>
             <a:endParaRPr lang="cs-CZ" dirty="0"/>
           </a:p>
         </p:txBody>
@@ -7436,7 +6441,7 @@
 </p:sld>
 </file>
 
-<file path=ppt/slides/slide16.xml><?xml version="1.0" encoding="utf-8"?>
+<file path=ppt/slides/slide11.xml><?xml version="1.0" encoding="utf-8"?>
 <p:sld xmlns:a="http://schemas.openxmlformats.org/drawingml/2006/main" xmlns:r="http://schemas.openxmlformats.org/officeDocument/2006/relationships" xmlns:p="http://schemas.openxmlformats.org/presentationml/2006/main">
   <p:cSld>
     <p:spTree>
@@ -7504,7 +6509,7 @@
           <a:p>
             <a:fld id="{D422A4B2-A3A8-46E2-928E-95CC170865B2}" type="datetime1">
               <a:rPr lang="cs-CZ" smtClean="0"/>
-              <a:t>23.04.2023</a:t>
+              <a:t>30.04.2023</a:t>
             </a:fld>
             <a:endParaRPr lang="cs-CZ" dirty="0"/>
           </a:p>
@@ -7533,8 +6538,12 @@
           <a:p>
             <a:fld id="{1BA6BF28-8B0B-4A51-9E07-225045E39492}" type="slidenum">
               <a:rPr lang="cs-CZ" smtClean="0"/>
-              <a:t>16</a:t>
+              <a:t>11</a:t>
             </a:fld>
+            <a:r>
+              <a:rPr lang="en-US" dirty="0"/>
+              <a:t> /15</a:t>
+            </a:r>
             <a:endParaRPr lang="cs-CZ" dirty="0"/>
           </a:p>
         </p:txBody>
@@ -7644,7 +6653,7 @@
 </p:sld>
 </file>
 
-<file path=ppt/slides/slide17.xml><?xml version="1.0" encoding="utf-8"?>
+<file path=ppt/slides/slide12.xml><?xml version="1.0" encoding="utf-8"?>
 <p:sld xmlns:a="http://schemas.openxmlformats.org/drawingml/2006/main" xmlns:r="http://schemas.openxmlformats.org/officeDocument/2006/relationships" xmlns:p="http://schemas.openxmlformats.org/presentationml/2006/main">
   <p:cSld>
     <p:spTree>
@@ -7712,7 +6721,7 @@
           <a:p>
             <a:fld id="{D422A4B2-A3A8-46E2-928E-95CC170865B2}" type="datetime1">
               <a:rPr lang="cs-CZ" smtClean="0"/>
-              <a:t>23.04.2023</a:t>
+              <a:t>30.04.2023</a:t>
             </a:fld>
             <a:endParaRPr lang="cs-CZ" dirty="0"/>
           </a:p>
@@ -7741,8 +6750,12 @@
           <a:p>
             <a:fld id="{1BA6BF28-8B0B-4A51-9E07-225045E39492}" type="slidenum">
               <a:rPr lang="cs-CZ" smtClean="0"/>
-              <a:t>17</a:t>
+              <a:t>12</a:t>
             </a:fld>
+            <a:r>
+              <a:rPr lang="en-US" dirty="0"/>
+              <a:t> /15</a:t>
+            </a:r>
             <a:endParaRPr lang="cs-CZ" dirty="0"/>
           </a:p>
         </p:txBody>
@@ -7856,7 +6869,7 @@
 </p:sld>
 </file>
 
-<file path=ppt/slides/slide18.xml><?xml version="1.0" encoding="utf-8"?>
+<file path=ppt/slides/slide13.xml><?xml version="1.0" encoding="utf-8"?>
 <p:sld xmlns:a="http://schemas.openxmlformats.org/drawingml/2006/main" xmlns:r="http://schemas.openxmlformats.org/officeDocument/2006/relationships" xmlns:p="http://schemas.openxmlformats.org/presentationml/2006/main">
   <p:cSld>
     <p:spTree>
@@ -7878,7 +6891,7 @@
           <p:cNvPr id="2" name="Title 1">
             <a:extLst>
               <a:ext uri="{FF2B5EF4-FFF2-40B4-BE49-F238E27FC236}">
-                <a16:creationId xmlns:a16="http://schemas.microsoft.com/office/drawing/2014/main" id="{38A438AC-F5C6-6865-EAE7-C53F1DEDBD3A}"/>
+                <a16:creationId xmlns:a16="http://schemas.microsoft.com/office/drawing/2014/main" id="{B785DA5E-EABC-E83B-D82A-D32B1193F46D}"/>
               </a:ext>
             </a:extLst>
           </p:cNvPr>
@@ -7895,8 +6908,8 @@
           <a:lstStyle/>
           <a:p>
             <a:r>
-              <a:rPr lang="cs-CZ" sz="4000" dirty="0"/>
-              <a:t>Výsledky</a:t>
+              <a:rPr lang="cs-CZ" dirty="0"/>
+              <a:t>Přínos optimalizací</a:t>
             </a:r>
           </a:p>
         </p:txBody>
@@ -7906,7 +6919,7 @@
           <p:cNvPr id="4" name="Date Placeholder 3">
             <a:extLst>
               <a:ext uri="{FF2B5EF4-FFF2-40B4-BE49-F238E27FC236}">
-                <a16:creationId xmlns:a16="http://schemas.microsoft.com/office/drawing/2014/main" id="{2B553397-37DB-18D7-14A8-7FC21DE5A325}"/>
+                <a16:creationId xmlns:a16="http://schemas.microsoft.com/office/drawing/2014/main" id="{4CBBE52C-D465-6447-C557-B02D49C8E6B9}"/>
               </a:ext>
             </a:extLst>
           </p:cNvPr>
@@ -7922,9 +6935,9 @@
           <a:bodyPr/>
           <a:lstStyle/>
           <a:p>
-            <a:fld id="{D422A4B2-A3A8-46E2-928E-95CC170865B2}" type="datetime1">
+            <a:fld id="{A94AFFAF-92E2-4360-8CE4-B3619D31DC61}" type="datetime1">
               <a:rPr lang="cs-CZ" smtClean="0"/>
-              <a:t>23.04.2023</a:t>
+              <a:t>30.04.2023</a:t>
             </a:fld>
             <a:endParaRPr lang="cs-CZ" dirty="0"/>
           </a:p>
@@ -7935,7 +6948,7 @@
           <p:cNvPr id="5" name="Slide Number Placeholder 4">
             <a:extLst>
               <a:ext uri="{FF2B5EF4-FFF2-40B4-BE49-F238E27FC236}">
-                <a16:creationId xmlns:a16="http://schemas.microsoft.com/office/drawing/2014/main" id="{544BDC0D-C63F-0E37-FD0C-324FA6CB95FD}"/>
+                <a16:creationId xmlns:a16="http://schemas.microsoft.com/office/drawing/2014/main" id="{858B558C-5DE8-3241-2FEC-7E1EE1E7F353}"/>
               </a:ext>
             </a:extLst>
           </p:cNvPr>
@@ -7953,72 +6966,90 @@
           <a:p>
             <a:fld id="{1BA6BF28-8B0B-4A51-9E07-225045E39492}" type="slidenum">
               <a:rPr lang="cs-CZ" smtClean="0"/>
-              <a:t>18</a:t>
+              <a:t>13</a:t>
             </a:fld>
+            <a:r>
+              <a:rPr lang="en-US" dirty="0"/>
+              <a:t> /15</a:t>
+            </a:r>
             <a:endParaRPr lang="cs-CZ" dirty="0"/>
           </a:p>
         </p:txBody>
       </p:sp>
       <p:sp>
         <p:nvSpPr>
-          <p:cNvPr id="7" name="Content Placeholder 2">
+          <p:cNvPr id="8" name="TextBox 7">
             <a:extLst>
               <a:ext uri="{FF2B5EF4-FFF2-40B4-BE49-F238E27FC236}">
-                <a16:creationId xmlns:a16="http://schemas.microsoft.com/office/drawing/2014/main" id="{549F87E3-9181-9C92-CC29-44186920BC9D}"/>
+                <a16:creationId xmlns:a16="http://schemas.microsoft.com/office/drawing/2014/main" id="{1C00BED5-1C82-99A3-635F-3600FE4BAB83}"/>
               </a:ext>
             </a:extLst>
           </p:cNvPr>
-          <p:cNvSpPr>
-            <a:spLocks noGrp="1"/>
-          </p:cNvSpPr>
-          <p:nvPr>
-            <p:ph idx="1"/>
-          </p:nvPr>
+          <p:cNvSpPr txBox="1"/>
+          <p:nvPr/>
         </p:nvSpPr>
         <p:spPr>
           <a:xfrm>
-            <a:off x="818712" y="2222287"/>
-            <a:ext cx="10554574" cy="3636511"/>
+            <a:off x="3111925" y="5893936"/>
+            <a:ext cx="5968143" cy="369332"/>
+          </a:xfrm>
+          <a:prstGeom prst="rect">
+            <a:avLst/>
+          </a:prstGeom>
+          <a:noFill/>
+        </p:spPr>
+        <p:txBody>
+          <a:bodyPr wrap="square" rtlCol="0">
+            <a:spAutoFit/>
+          </a:bodyPr>
+          <a:lstStyle/>
+          <a:p>
+            <a:r>
+              <a:rPr lang="cs-CZ" dirty="0"/>
+              <a:t>Obr. 7: Příklad na snímkové frekvenci. [Zdroj vlastní]</a:t>
+            </a:r>
+          </a:p>
+        </p:txBody>
+      </p:sp>
+      <p:pic>
+        <p:nvPicPr>
+          <p:cNvPr id="12" name="Content Placeholder 11" descr="A picture containing graphical user interface&#10;&#10;Description automatically generated">
+            <a:extLst>
+              <a:ext uri="{FF2B5EF4-FFF2-40B4-BE49-F238E27FC236}">
+                <a16:creationId xmlns:a16="http://schemas.microsoft.com/office/drawing/2014/main" id="{2E84ABAB-2FC8-37F4-8599-B20255527CFD}"/>
+              </a:ext>
+            </a:extLst>
+          </p:cNvPr>
+          <p:cNvPicPr>
+            <a:picLocks noGrp="1" noChangeAspect="1"/>
+          </p:cNvPicPr>
+          <p:nvPr>
+            <p:ph idx="1"/>
+          </p:nvPr>
+        </p:nvPicPr>
+        <p:blipFill>
+          <a:blip r:embed="rId2">
+            <a:extLst>
+              <a:ext uri="{28A0092B-C50C-407E-A947-70E740481C1C}">
+                <a14:useLocalDpi xmlns:a14="http://schemas.microsoft.com/office/drawing/2010/main" val="0"/>
+              </a:ext>
+            </a:extLst>
+          </a:blip>
+          <a:stretch>
+            <a:fillRect/>
+          </a:stretch>
+        </p:blipFill>
+        <p:spPr>
+          <a:xfrm>
+            <a:off x="2881369" y="2161540"/>
+            <a:ext cx="6429257" cy="3636963"/>
           </a:xfrm>
         </p:spPr>
-        <p:txBody>
-          <a:bodyPr>
-            <a:normAutofit/>
-          </a:bodyPr>
-          <a:lstStyle/>
-          <a:p>
-            <a:r>
-              <a:rPr lang="cs-CZ" sz="2400" dirty="0"/>
-              <a:t>Dopady na výkon aplikace</a:t>
-            </a:r>
-          </a:p>
-          <a:p>
-            <a:r>
-              <a:rPr lang="cs-CZ" sz="2400" dirty="0"/>
-              <a:t>Lepší využití hardware</a:t>
-            </a:r>
-          </a:p>
-          <a:p>
-            <a:r>
-              <a:rPr lang="cs-CZ" sz="2400" dirty="0"/>
-              <a:t>Potenciální úspora energie</a:t>
-            </a:r>
-          </a:p>
-          <a:p>
-            <a:r>
-              <a:rPr lang="cs-CZ" sz="2400" dirty="0"/>
-              <a:t>Optimalizovat tam, kde to dává smysl</a:t>
-            </a:r>
-          </a:p>
-          <a:p>
-            <a:endParaRPr lang="cs-CZ" sz="2400" dirty="0"/>
-          </a:p>
-        </p:txBody>
-      </p:sp>
+      </p:pic>
     </p:spTree>
     <p:extLst>
       <p:ext uri="{BB962C8B-B14F-4D97-AF65-F5344CB8AC3E}">
-        <p14:creationId xmlns:p14="http://schemas.microsoft.com/office/powerpoint/2010/main" val="3074384766"/>
+        <p14:creationId xmlns:p14="http://schemas.microsoft.com/office/powerpoint/2010/main" val="1530079587"/>
       </p:ext>
     </p:extLst>
   </p:cSld>
@@ -8028,7 +7059,7 @@
 </p:sld>
 </file>
 
-<file path=ppt/slides/slide19.xml><?xml version="1.0" encoding="utf-8"?>
+<file path=ppt/slides/slide14.xml><?xml version="1.0" encoding="utf-8"?>
 <p:sld xmlns:a="http://schemas.openxmlformats.org/drawingml/2006/main" xmlns:r="http://schemas.openxmlformats.org/officeDocument/2006/relationships" xmlns:p="http://schemas.openxmlformats.org/presentationml/2006/main">
   <p:cSld>
     <p:spTree>
@@ -8132,7 +7163,7 @@
           <a:p>
             <a:fld id="{DCD4A90C-D7B5-48DF-B548-045E8E9681DA}" type="datetime1">
               <a:rPr lang="cs-CZ" smtClean="0"/>
-              <a:t>23.04.2023</a:t>
+              <a:t>30.04.2023</a:t>
             </a:fld>
             <a:endParaRPr lang="cs-CZ" dirty="0"/>
           </a:p>
@@ -8161,8 +7192,12 @@
           <a:p>
             <a:fld id="{1BA6BF28-8B0B-4A51-9E07-225045E39492}" type="slidenum">
               <a:rPr lang="cs-CZ" smtClean="0"/>
-              <a:t>19</a:t>
+              <a:t>14</a:t>
             </a:fld>
+            <a:r>
+              <a:rPr lang="en-US" dirty="0"/>
+              <a:t> /15</a:t>
+            </a:r>
             <a:endParaRPr lang="cs-CZ" dirty="0"/>
           </a:p>
         </p:txBody>
@@ -8233,6 +7268,166 @@
     <p:extLst>
       <p:ext uri="{BB962C8B-B14F-4D97-AF65-F5344CB8AC3E}">
         <p14:creationId xmlns:p14="http://schemas.microsoft.com/office/powerpoint/2010/main" val="3295751797"/>
+      </p:ext>
+    </p:extLst>
+  </p:cSld>
+  <p:clrMapOvr>
+    <a:masterClrMapping/>
+  </p:clrMapOvr>
+</p:sld>
+</file>
+
+<file path=ppt/slides/slide15.xml><?xml version="1.0" encoding="utf-8"?>
+<p:sld xmlns:a="http://schemas.openxmlformats.org/drawingml/2006/main" xmlns:r="http://schemas.openxmlformats.org/officeDocument/2006/relationships" xmlns:p="http://schemas.openxmlformats.org/presentationml/2006/main">
+  <p:cSld>
+    <p:spTree>
+      <p:nvGrpSpPr>
+        <p:cNvPr id="1" name=""/>
+        <p:cNvGrpSpPr/>
+        <p:nvPr/>
+      </p:nvGrpSpPr>
+      <p:grpSpPr>
+        <a:xfrm>
+          <a:off x="0" y="0"/>
+          <a:ext cx="0" cy="0"/>
+          <a:chOff x="0" y="0"/>
+          <a:chExt cx="0" cy="0"/>
+        </a:xfrm>
+      </p:grpSpPr>
+      <p:sp>
+        <p:nvSpPr>
+          <p:cNvPr id="2" name="Title 1">
+            <a:extLst>
+              <a:ext uri="{FF2B5EF4-FFF2-40B4-BE49-F238E27FC236}">
+                <a16:creationId xmlns:a16="http://schemas.microsoft.com/office/drawing/2014/main" id="{38A438AC-F5C6-6865-EAE7-C53F1DEDBD3A}"/>
+              </a:ext>
+            </a:extLst>
+          </p:cNvPr>
+          <p:cNvSpPr>
+            <a:spLocks noGrp="1"/>
+          </p:cNvSpPr>
+          <p:nvPr>
+            <p:ph type="title"/>
+          </p:nvPr>
+        </p:nvSpPr>
+        <p:spPr/>
+        <p:txBody>
+          <a:bodyPr/>
+          <a:lstStyle/>
+          <a:p>
+            <a:r>
+              <a:rPr lang="en-US" sz="4000" dirty="0" err="1"/>
+              <a:t>Otázky</a:t>
+            </a:r>
+            <a:endParaRPr lang="cs-CZ" sz="4000" dirty="0"/>
+          </a:p>
+        </p:txBody>
+      </p:sp>
+      <p:sp>
+        <p:nvSpPr>
+          <p:cNvPr id="4" name="Date Placeholder 3">
+            <a:extLst>
+              <a:ext uri="{FF2B5EF4-FFF2-40B4-BE49-F238E27FC236}">
+                <a16:creationId xmlns:a16="http://schemas.microsoft.com/office/drawing/2014/main" id="{2B553397-37DB-18D7-14A8-7FC21DE5A325}"/>
+              </a:ext>
+            </a:extLst>
+          </p:cNvPr>
+          <p:cNvSpPr>
+            <a:spLocks noGrp="1"/>
+          </p:cNvSpPr>
+          <p:nvPr>
+            <p:ph type="dt" sz="half" idx="10"/>
+          </p:nvPr>
+        </p:nvSpPr>
+        <p:spPr/>
+        <p:txBody>
+          <a:bodyPr/>
+          <a:lstStyle/>
+          <a:p>
+            <a:fld id="{D422A4B2-A3A8-46E2-928E-95CC170865B2}" type="datetime1">
+              <a:rPr lang="cs-CZ" smtClean="0"/>
+              <a:t>30.04.2023</a:t>
+            </a:fld>
+            <a:endParaRPr lang="cs-CZ" dirty="0"/>
+          </a:p>
+        </p:txBody>
+      </p:sp>
+      <p:sp>
+        <p:nvSpPr>
+          <p:cNvPr id="5" name="Slide Number Placeholder 4">
+            <a:extLst>
+              <a:ext uri="{FF2B5EF4-FFF2-40B4-BE49-F238E27FC236}">
+                <a16:creationId xmlns:a16="http://schemas.microsoft.com/office/drawing/2014/main" id="{544BDC0D-C63F-0E37-FD0C-324FA6CB95FD}"/>
+              </a:ext>
+            </a:extLst>
+          </p:cNvPr>
+          <p:cNvSpPr>
+            <a:spLocks noGrp="1"/>
+          </p:cNvSpPr>
+          <p:nvPr>
+            <p:ph type="sldNum" sz="quarter" idx="12"/>
+          </p:nvPr>
+        </p:nvSpPr>
+        <p:spPr/>
+        <p:txBody>
+          <a:bodyPr/>
+          <a:lstStyle/>
+          <a:p>
+            <a:fld id="{1BA6BF28-8B0B-4A51-9E07-225045E39492}" type="slidenum">
+              <a:rPr lang="cs-CZ" smtClean="0"/>
+              <a:t>15</a:t>
+            </a:fld>
+            <a:r>
+              <a:rPr lang="en-US" dirty="0"/>
+              <a:t> /15</a:t>
+            </a:r>
+            <a:endParaRPr lang="cs-CZ" dirty="0"/>
+          </a:p>
+        </p:txBody>
+      </p:sp>
+      <p:sp>
+        <p:nvSpPr>
+          <p:cNvPr id="7" name="Content Placeholder 2">
+            <a:extLst>
+              <a:ext uri="{FF2B5EF4-FFF2-40B4-BE49-F238E27FC236}">
+                <a16:creationId xmlns:a16="http://schemas.microsoft.com/office/drawing/2014/main" id="{549F87E3-9181-9C92-CC29-44186920BC9D}"/>
+              </a:ext>
+            </a:extLst>
+          </p:cNvPr>
+          <p:cNvSpPr>
+            <a:spLocks noGrp="1"/>
+          </p:cNvSpPr>
+          <p:nvPr>
+            <p:ph idx="1"/>
+          </p:nvPr>
+        </p:nvSpPr>
+        <p:spPr>
+          <a:xfrm>
+            <a:off x="818712" y="2222287"/>
+            <a:ext cx="10554574" cy="3636511"/>
+          </a:xfrm>
+        </p:spPr>
+        <p:txBody>
+          <a:bodyPr>
+            <a:normAutofit/>
+          </a:bodyPr>
+          <a:lstStyle/>
+          <a:p>
+            <a:r>
+              <a:rPr lang="en-US" sz="2400" dirty="0"/>
+              <a:t>TODO</a:t>
+            </a:r>
+            <a:endParaRPr lang="cs-CZ" sz="2400" dirty="0"/>
+          </a:p>
+          <a:p>
+            <a:endParaRPr lang="cs-CZ" sz="2400" dirty="0"/>
+          </a:p>
+        </p:txBody>
+      </p:sp>
+    </p:spTree>
+    <p:extLst>
+      <p:ext uri="{BB962C8B-B14F-4D97-AF65-F5344CB8AC3E}">
+        <p14:creationId xmlns:p14="http://schemas.microsoft.com/office/powerpoint/2010/main" val="1920063"/>
       </p:ext>
     </p:extLst>
   </p:cSld>
@@ -8318,13 +7513,7 @@
           <a:p>
             <a:r>
               <a:rPr lang="cs-CZ" sz="2400" dirty="0"/>
-              <a:t>Cíle práce</a:t>
-            </a:r>
-          </a:p>
-          <a:p>
-            <a:r>
-              <a:rPr lang="cs-CZ" sz="2400" dirty="0"/>
-              <a:t>Vlastní přínos</a:t>
+              <a:t>Body zadání</a:t>
             </a:r>
           </a:p>
           <a:p>
@@ -8336,7 +7525,19 @@
           <a:p>
             <a:r>
               <a:rPr lang="cs-CZ" sz="2400" dirty="0"/>
-              <a:t>Výsledky</a:t>
+              <a:t>Implementované optimalizace</a:t>
+            </a:r>
+          </a:p>
+          <a:p>
+            <a:r>
+              <a:rPr lang="cs-CZ" sz="2400" dirty="0"/>
+              <a:t>Ukázka</a:t>
+            </a:r>
+          </a:p>
+          <a:p>
+            <a:r>
+              <a:rPr lang="cs-CZ" sz="2400" dirty="0"/>
+              <a:t>Přínos optimalizací</a:t>
             </a:r>
           </a:p>
         </p:txBody>
@@ -8364,7 +7565,7 @@
           <a:p>
             <a:fld id="{D422A4B2-A3A8-46E2-928E-95CC170865B2}" type="datetime1">
               <a:rPr lang="cs-CZ" smtClean="0"/>
-              <a:t>23.04.2023</a:t>
+              <a:t>30.04.2023</a:t>
             </a:fld>
             <a:endParaRPr lang="cs-CZ" dirty="0"/>
           </a:p>
@@ -8395,6 +7596,10 @@
               <a:rPr lang="cs-CZ" smtClean="0"/>
               <a:t>2</a:t>
             </a:fld>
+            <a:r>
+              <a:rPr lang="en-US" dirty="0"/>
+              <a:t> /15</a:t>
+            </a:r>
             <a:endParaRPr lang="cs-CZ" dirty="0"/>
           </a:p>
         </p:txBody>
@@ -8550,7 +7755,7 @@
           <a:p>
             <a:fld id="{D422A4B2-A3A8-46E2-928E-95CC170865B2}" type="datetime1">
               <a:rPr lang="cs-CZ" smtClean="0"/>
-              <a:t>23.04.2023</a:t>
+              <a:t>30.04.2023</a:t>
             </a:fld>
             <a:endParaRPr lang="cs-CZ" dirty="0"/>
           </a:p>
@@ -8581,6 +7786,10 @@
               <a:rPr lang="cs-CZ" smtClean="0"/>
               <a:t>3</a:t>
             </a:fld>
+            <a:r>
+              <a:rPr lang="en-US" dirty="0"/>
+              <a:t> /15</a:t>
+            </a:r>
             <a:endParaRPr lang="cs-CZ" dirty="0"/>
           </a:p>
         </p:txBody>
@@ -8637,9 +7846,14 @@
           <a:lstStyle/>
           <a:p>
             <a:r>
-              <a:rPr lang="cs-CZ" sz="4000" dirty="0"/>
-              <a:t>Cíle práce</a:t>
-            </a:r>
+              <a:rPr lang="en-US" sz="4000" dirty="0"/>
+              <a:t>Body </a:t>
+            </a:r>
+            <a:r>
+              <a:rPr lang="en-US" sz="4000" dirty="0" err="1"/>
+              <a:t>zadání</a:t>
+            </a:r>
+            <a:endParaRPr lang="cs-CZ" sz="4000" dirty="0"/>
           </a:p>
         </p:txBody>
       </p:sp>
@@ -8659,34 +7873,83 @@
             <p:ph idx="1"/>
           </p:nvPr>
         </p:nvSpPr>
-        <p:spPr/>
+        <p:spPr>
+          <a:xfrm>
+            <a:off x="818712" y="2222287"/>
+            <a:ext cx="10727112" cy="3819075"/>
+          </a:xfrm>
+        </p:spPr>
         <p:txBody>
           <a:bodyPr>
             <a:normAutofit/>
           </a:bodyPr>
           <a:lstStyle/>
           <a:p>
-            <a:r>
-              <a:rPr lang="cs-CZ" sz="2400" i="1" dirty="0"/>
+            <a:pPr>
+              <a:buFont typeface="+mj-lt"/>
+              <a:buAutoNum type="arabicPeriod"/>
+            </a:pPr>
+            <a:r>
+              <a:rPr lang="cs-CZ" sz="2400" dirty="0"/>
               <a:t>Definujte pojem datově orientovaný návrh a seznamte se s touto problematikou.</a:t>
             </a:r>
           </a:p>
           <a:p>
-            <a:pPr marL="0" indent="0">
-              <a:buNone/>
+            <a:pPr>
+              <a:buFont typeface="+mj-lt"/>
+              <a:buAutoNum type="arabicPeriod"/>
             </a:pPr>
-            <a:endParaRPr lang="cs-CZ" sz="2400" i="1" dirty="0"/>
-          </a:p>
-          <a:p>
             <a:r>
               <a:rPr lang="cs-CZ" sz="2400" dirty="0"/>
-              <a:t>Definice</a:t>
-            </a:r>
-          </a:p>
-          <a:p>
+              <a:t>Porovnejte tento způsob návrhu s objektově orientovaným návrhem.</a:t>
+            </a:r>
+          </a:p>
+          <a:p>
+            <a:pPr>
+              <a:buFont typeface="+mj-lt"/>
+              <a:buAutoNum type="arabicPeriod"/>
+            </a:pPr>
             <a:r>
               <a:rPr lang="cs-CZ" sz="2400" dirty="0"/>
-              <a:t>Hlavní myšlenky</a:t>
+              <a:t>Popište vliv </a:t>
+            </a:r>
+            <a:r>
+              <a:rPr lang="cs-CZ" sz="2400" dirty="0" err="1"/>
+              <a:t>mikroarchitektury</a:t>
+            </a:r>
+            <a:r>
+              <a:rPr lang="cs-CZ" sz="2400" dirty="0"/>
+              <a:t> počítače na rychlost běhu programu.</a:t>
+            </a:r>
+          </a:p>
+          <a:p>
+            <a:pPr>
+              <a:buFont typeface="+mj-lt"/>
+              <a:buAutoNum type="arabicPeriod"/>
+            </a:pPr>
+            <a:r>
+              <a:rPr lang="cs-CZ" sz="2400" dirty="0"/>
+              <a:t>Demonstrujte jednotlivé principy na příkladech.</a:t>
+            </a:r>
+          </a:p>
+          <a:p>
+            <a:pPr>
+              <a:buFont typeface="+mj-lt"/>
+              <a:buAutoNum type="arabicPeriod"/>
+            </a:pPr>
+            <a:r>
+              <a:rPr lang="cs-CZ" sz="2400" dirty="0"/>
+              <a:t>Ověřte efektivitu programů pomocí nástrojů pro výkonnostní testy a profilování.</a:t>
+            </a:r>
+          </a:p>
+          <a:p>
+            <a:pPr>
+              <a:buFont typeface="+mj-lt"/>
+              <a:buAutoNum type="arabicPeriod"/>
+            </a:pPr>
+            <a:r>
+              <a:rPr lang="cs-CZ" sz="2400" dirty="0"/>
+              <a:t>Sestavte sadu doporučení pro využití datově orientovaného přístupu.</a:t>
             </a:r>
           </a:p>
         </p:txBody>
@@ -8714,7 +7977,7 @@
           <a:p>
             <a:fld id="{D422A4B2-A3A8-46E2-928E-95CC170865B2}" type="datetime1">
               <a:rPr lang="cs-CZ" smtClean="0"/>
-              <a:t>23.04.2023</a:t>
+              <a:t>30.04.2023</a:t>
             </a:fld>
             <a:endParaRPr lang="cs-CZ" dirty="0"/>
           </a:p>
@@ -8745,6 +8008,10 @@
               <a:rPr lang="cs-CZ" smtClean="0"/>
               <a:t>4</a:t>
             </a:fld>
+            <a:r>
+              <a:rPr lang="en-US" dirty="0"/>
+              <a:t> /15</a:t>
+            </a:r>
             <a:endParaRPr lang="cs-CZ" dirty="0"/>
           </a:p>
         </p:txBody>
@@ -8802,7 +8069,7 @@
           <a:p>
             <a:r>
               <a:rPr lang="cs-CZ" sz="4000" dirty="0"/>
-              <a:t>Cíle práce</a:t>
+              <a:t>Použité technologie</a:t>
             </a:r>
           </a:p>
         </p:txBody>
@@ -8823,12 +8090,7 @@
             <p:ph idx="1"/>
           </p:nvPr>
         </p:nvSpPr>
-        <p:spPr>
-          <a:xfrm>
-            <a:off x="818712" y="2222287"/>
-            <a:ext cx="10563286" cy="3636511"/>
-          </a:xfrm>
-        </p:spPr>
+        <p:spPr/>
         <p:txBody>
           <a:bodyPr>
             <a:normAutofit/>
@@ -8836,26 +8098,52 @@
           <a:lstStyle/>
           <a:p>
             <a:r>
-              <a:rPr lang="cs-CZ" sz="2400" i="1" dirty="0"/>
-              <a:t>Porovnejte tento způsob návrhu s objektově orientovaným návrhem.</a:t>
-            </a:r>
-          </a:p>
-          <a:p>
-            <a:pPr marL="0" indent="0">
-              <a:buNone/>
-            </a:pPr>
-            <a:endParaRPr lang="cs-CZ" sz="2400" i="1" dirty="0"/>
-          </a:p>
-          <a:p>
-            <a:r>
               <a:rPr lang="cs-CZ" sz="2400" dirty="0"/>
-              <a:t>Rozdíl v hlavních myšlenkách</a:t>
-            </a:r>
+              <a:t>Programovací jazyk C++</a:t>
+            </a:r>
+            <a:r>
+              <a:rPr lang="en-US" sz="2400" dirty="0"/>
+              <a:t> (GCC, Clang a MSVC)</a:t>
+            </a:r>
+            <a:endParaRPr lang="cs-CZ" sz="2400" dirty="0"/>
           </a:p>
           <a:p>
             <a:r>
               <a:rPr lang="cs-CZ" sz="2400" dirty="0"/>
-              <a:t>Rozdíl v implementaci</a:t>
+              <a:t>Časování pomocí Google Benchmark</a:t>
+            </a:r>
+          </a:p>
+          <a:p>
+            <a:r>
+              <a:rPr lang="cs-CZ" sz="2400" dirty="0"/>
+              <a:t>Vzorkovací </a:t>
+            </a:r>
+            <a:r>
+              <a:rPr lang="cs-CZ" sz="2400" dirty="0" err="1"/>
+              <a:t>profiler</a:t>
+            </a:r>
+            <a:r>
+              <a:rPr lang="cs-CZ" sz="2400" dirty="0"/>
+              <a:t> Intel </a:t>
+            </a:r>
+            <a:r>
+              <a:rPr lang="cs-CZ" sz="2400" dirty="0" err="1"/>
+              <a:t>vTune</a:t>
+            </a:r>
+            <a:endParaRPr lang="cs-CZ" sz="2400" dirty="0"/>
+          </a:p>
+          <a:p>
+            <a:r>
+              <a:rPr lang="cs-CZ" sz="2400" dirty="0"/>
+              <a:t>Instrumentační </a:t>
+            </a:r>
+            <a:r>
+              <a:rPr lang="cs-CZ" sz="2400" dirty="0" err="1"/>
+              <a:t>profiler</a:t>
+            </a:r>
+            <a:r>
+              <a:rPr lang="cs-CZ" sz="2400" dirty="0"/>
+              <a:t> Tracy</a:t>
             </a:r>
           </a:p>
         </p:txBody>
@@ -8883,7 +8171,7 @@
           <a:p>
             <a:fld id="{D422A4B2-A3A8-46E2-928E-95CC170865B2}" type="datetime1">
               <a:rPr lang="cs-CZ" smtClean="0"/>
-              <a:t>23.04.2023</a:t>
+              <a:t>30.04.2023</a:t>
             </a:fld>
             <a:endParaRPr lang="cs-CZ" dirty="0"/>
           </a:p>
@@ -8914,6 +8202,10 @@
               <a:rPr lang="cs-CZ" smtClean="0"/>
               <a:t>5</a:t>
             </a:fld>
+            <a:r>
+              <a:rPr lang="en-US" dirty="0"/>
+              <a:t> /15</a:t>
+            </a:r>
             <a:endParaRPr lang="cs-CZ" dirty="0"/>
           </a:p>
         </p:txBody>
@@ -8921,7 +8213,7 @@
     </p:spTree>
     <p:extLst>
       <p:ext uri="{BB962C8B-B14F-4D97-AF65-F5344CB8AC3E}">
-        <p14:creationId xmlns:p14="http://schemas.microsoft.com/office/powerpoint/2010/main" val="3826392206"/>
+        <p14:creationId xmlns:p14="http://schemas.microsoft.com/office/powerpoint/2010/main" val="2310293848"/>
       </p:ext>
     </p:extLst>
   </p:cSld>
@@ -8971,7 +8263,7 @@
           <a:p>
             <a:r>
               <a:rPr lang="cs-CZ" sz="4000" dirty="0"/>
-              <a:t>Cíle práce</a:t>
+              <a:t>Implementované optimalizace</a:t>
             </a:r>
           </a:p>
         </p:txBody>
@@ -8992,12 +8284,7 @@
             <p:ph idx="1"/>
           </p:nvPr>
         </p:nvSpPr>
-        <p:spPr>
-          <a:xfrm>
-            <a:off x="818712" y="2279377"/>
-            <a:ext cx="10554574" cy="3636511"/>
-          </a:xfrm>
-        </p:spPr>
+        <p:spPr/>
         <p:txBody>
           <a:bodyPr>
             <a:normAutofit/>
@@ -9005,40 +8292,35 @@
           <a:lstStyle/>
           <a:p>
             <a:r>
-              <a:rPr lang="cs-CZ" sz="2400" i="1" dirty="0"/>
-              <a:t>Popište vliv </a:t>
-            </a:r>
-            <a:r>
-              <a:rPr lang="cs-CZ" sz="2400" i="1" dirty="0" err="1"/>
-              <a:t>mikroarchitektury</a:t>
-            </a:r>
-            <a:r>
-              <a:rPr lang="cs-CZ" sz="2400" i="1" dirty="0"/>
-              <a:t> počítače na rychlost běhu programu.</a:t>
-            </a:r>
-            <a:endParaRPr lang="en-US" sz="2400" i="1" dirty="0"/>
-          </a:p>
-          <a:p>
-            <a:pPr marL="0" indent="0">
-              <a:buNone/>
-            </a:pPr>
-            <a:endParaRPr lang="cs-CZ" sz="2400" i="1" dirty="0"/>
-          </a:p>
-          <a:p>
-            <a:pPr marL="0" indent="0">
-              <a:buNone/>
-            </a:pPr>
-            <a:endParaRPr lang="cs-CZ" sz="2400" i="1" dirty="0"/>
-          </a:p>
-          <a:p>
-            <a:r>
               <a:rPr lang="cs-CZ" sz="2400" dirty="0"/>
-              <a:t>Popis funkce hardware</a:t>
-            </a:r>
-            <a:endParaRPr lang="en-US" sz="2400" dirty="0"/>
-          </a:p>
-          <a:p>
-            <a:endParaRPr lang="en-US" sz="2400" dirty="0"/>
+              <a:t>Iterace smyčkou – </a:t>
+            </a:r>
+            <a:r>
+              <a:rPr lang="cs-CZ" sz="2400" dirty="0" err="1"/>
+              <a:t>unrolling</a:t>
+            </a:r>
+            <a:r>
+              <a:rPr lang="cs-CZ" sz="2400" dirty="0"/>
+              <a:t>, odstranění závislostí</a:t>
+            </a:r>
+          </a:p>
+          <a:p>
+            <a:r>
+              <a:rPr lang="cs-CZ" sz="2400" dirty="0"/>
+              <a:t>Organizace datových struktur</a:t>
+            </a:r>
+          </a:p>
+          <a:p>
+            <a:r>
+              <a:rPr lang="cs-CZ" sz="2400" dirty="0"/>
+              <a:t>Zarovnání dat v paměti</a:t>
+            </a:r>
+          </a:p>
+          <a:p>
+            <a:r>
+              <a:rPr lang="cs-CZ" sz="2400" dirty="0"/>
+              <a:t>Exploatace paralelismu hardware</a:t>
+            </a:r>
           </a:p>
         </p:txBody>
       </p:sp>
@@ -9065,7 +8347,7 @@
           <a:p>
             <a:fld id="{D422A4B2-A3A8-46E2-928E-95CC170865B2}" type="datetime1">
               <a:rPr lang="cs-CZ" smtClean="0"/>
-              <a:t>23.04.2023</a:t>
+              <a:t>30.04.2023</a:t>
             </a:fld>
             <a:endParaRPr lang="cs-CZ" dirty="0"/>
           </a:p>
@@ -9096,6 +8378,10 @@
               <a:rPr lang="cs-CZ" smtClean="0"/>
               <a:t>6</a:t>
             </a:fld>
+            <a:r>
+              <a:rPr lang="en-US" dirty="0"/>
+              <a:t> /15</a:t>
+            </a:r>
             <a:endParaRPr lang="cs-CZ" dirty="0"/>
           </a:p>
         </p:txBody>
@@ -9103,7 +8389,7 @@
     </p:spTree>
     <p:extLst>
       <p:ext uri="{BB962C8B-B14F-4D97-AF65-F5344CB8AC3E}">
-        <p14:creationId xmlns:p14="http://schemas.microsoft.com/office/powerpoint/2010/main" val="4266090785"/>
+        <p14:creationId xmlns:p14="http://schemas.microsoft.com/office/powerpoint/2010/main" val="3354304777"/>
       </p:ext>
     </p:extLst>
   </p:cSld>
@@ -9152,59 +8438,10 @@
           <a:lstStyle/>
           <a:p>
             <a:r>
-              <a:rPr lang="cs-CZ" sz="4000" dirty="0"/>
-              <a:t>Cíle práce</a:t>
-            </a:r>
-          </a:p>
-        </p:txBody>
-      </p:sp>
-      <p:sp>
-        <p:nvSpPr>
-          <p:cNvPr id="3" name="Content Placeholder 2">
-            <a:extLst>
-              <a:ext uri="{FF2B5EF4-FFF2-40B4-BE49-F238E27FC236}">
-                <a16:creationId xmlns:a16="http://schemas.microsoft.com/office/drawing/2014/main" id="{00155661-0FAF-5BD1-B8EA-8F9137A3B724}"/>
-              </a:ext>
-            </a:extLst>
-          </p:cNvPr>
-          <p:cNvSpPr>
-            <a:spLocks noGrp="1"/>
-          </p:cNvSpPr>
-          <p:nvPr>
-            <p:ph idx="1"/>
-          </p:nvPr>
-        </p:nvSpPr>
-        <p:spPr>
-          <a:xfrm>
-            <a:off x="818712" y="2069887"/>
-            <a:ext cx="10554574" cy="3636511"/>
-          </a:xfrm>
-        </p:spPr>
-        <p:txBody>
-          <a:bodyPr>
-            <a:normAutofit/>
-          </a:bodyPr>
-          <a:lstStyle/>
-          <a:p>
-            <a:r>
-              <a:rPr lang="cs-CZ" sz="2400" i="1" dirty="0"/>
-              <a:t>Demonstrujte jednotlivé principy na příkladech.</a:t>
-            </a:r>
-          </a:p>
-          <a:p>
-            <a:pPr marL="0" indent="0">
-              <a:buNone/>
-            </a:pPr>
-            <a:endParaRPr lang="cs-CZ" sz="2400" i="1" dirty="0"/>
-          </a:p>
-          <a:p>
-            <a:r>
-              <a:rPr lang="cs-CZ" sz="2400" dirty="0"/>
-              <a:t>Ukázka spolupráce s hardware</a:t>
-            </a:r>
-          </a:p>
-          <a:p>
-            <a:endParaRPr lang="cs-CZ" sz="2400" dirty="0"/>
+              <a:rPr lang="en-US" sz="4000" dirty="0" err="1"/>
+              <a:t>Ukázka</a:t>
+            </a:r>
+            <a:endParaRPr lang="cs-CZ" sz="4000" dirty="0"/>
           </a:p>
         </p:txBody>
       </p:sp>
@@ -9231,7 +8468,7 @@
           <a:p>
             <a:fld id="{D422A4B2-A3A8-46E2-928E-95CC170865B2}" type="datetime1">
               <a:rPr lang="cs-CZ" smtClean="0"/>
-              <a:t>23.04.2023</a:t>
+              <a:t>30.04.2023</a:t>
             </a:fld>
             <a:endParaRPr lang="cs-CZ" dirty="0"/>
           </a:p>
@@ -9262,6 +8499,101 @@
               <a:rPr lang="cs-CZ" smtClean="0"/>
               <a:t>7</a:t>
             </a:fld>
+            <a:r>
+              <a:rPr lang="en-US" dirty="0"/>
+              <a:t> /15</a:t>
+            </a:r>
+            <a:endParaRPr lang="cs-CZ" dirty="0"/>
+          </a:p>
+        </p:txBody>
+      </p:sp>
+      <p:pic>
+        <p:nvPicPr>
+          <p:cNvPr id="11" name="Content Placeholder 10" descr="Graphical user interface, text, application&#10;&#10;Description automatically generated">
+            <a:extLst>
+              <a:ext uri="{FF2B5EF4-FFF2-40B4-BE49-F238E27FC236}">
+                <a16:creationId xmlns:a16="http://schemas.microsoft.com/office/drawing/2014/main" id="{798BAC9F-5710-8EC2-6944-2057F258F5A8}"/>
+              </a:ext>
+            </a:extLst>
+          </p:cNvPr>
+          <p:cNvPicPr>
+            <a:picLocks noGrp="1" noChangeAspect="1"/>
+          </p:cNvPicPr>
+          <p:nvPr>
+            <p:ph idx="1"/>
+          </p:nvPr>
+        </p:nvPicPr>
+        <p:blipFill>
+          <a:blip r:embed="rId2">
+            <a:extLst>
+              <a:ext uri="{28A0092B-C50C-407E-A947-70E740481C1C}">
+                <a14:useLocalDpi xmlns:a14="http://schemas.microsoft.com/office/drawing/2010/main" val="0"/>
+              </a:ext>
+            </a:extLst>
+          </a:blip>
+          <a:stretch>
+            <a:fillRect/>
+          </a:stretch>
+        </p:blipFill>
+        <p:spPr>
+          <a:xfrm>
+            <a:off x="2614793" y="2095546"/>
+            <a:ext cx="6962414" cy="3403315"/>
+          </a:xfrm>
+        </p:spPr>
+      </p:pic>
+      <p:sp>
+        <p:nvSpPr>
+          <p:cNvPr id="12" name="TextBox 11">
+            <a:extLst>
+              <a:ext uri="{FF2B5EF4-FFF2-40B4-BE49-F238E27FC236}">
+                <a16:creationId xmlns:a16="http://schemas.microsoft.com/office/drawing/2014/main" id="{697A0AB9-D9BA-7CB2-B7CC-43FE2682301F}"/>
+              </a:ext>
+            </a:extLst>
+          </p:cNvPr>
+          <p:cNvSpPr txBox="1"/>
+          <p:nvPr/>
+        </p:nvSpPr>
+        <p:spPr>
+          <a:xfrm>
+            <a:off x="3509574" y="5498861"/>
+            <a:ext cx="5172849" cy="369332"/>
+          </a:xfrm>
+          <a:prstGeom prst="rect">
+            <a:avLst/>
+          </a:prstGeom>
+          <a:noFill/>
+        </p:spPr>
+        <p:txBody>
+          <a:bodyPr wrap="square" rtlCol="0">
+            <a:spAutoFit/>
+          </a:bodyPr>
+          <a:lstStyle/>
+          <a:p>
+            <a:r>
+              <a:rPr lang="cs-CZ" dirty="0"/>
+              <a:t>Obr. 1: Ukázka OOP přístupu</a:t>
+            </a:r>
+            <a:r>
+              <a:rPr lang="en-US" dirty="0"/>
+              <a:t>. [</a:t>
+            </a:r>
+            <a:r>
+              <a:rPr lang="en-US" dirty="0" err="1"/>
+              <a:t>Zdroj</a:t>
+            </a:r>
+            <a:r>
+              <a:rPr lang="en-US" dirty="0"/>
+              <a:t> </a:t>
+            </a:r>
+            <a:r>
+              <a:rPr lang="en-US" dirty="0" err="1"/>
+              <a:t>vlastní</a:t>
+            </a:r>
+            <a:r>
+              <a:rPr lang="en-US" dirty="0"/>
+              <a:t>]</a:t>
+            </a:r>
             <a:endParaRPr lang="cs-CZ" dirty="0"/>
           </a:p>
         </p:txBody>
@@ -9269,7 +8601,7 @@
     </p:spTree>
     <p:extLst>
       <p:ext uri="{BB962C8B-B14F-4D97-AF65-F5344CB8AC3E}">
-        <p14:creationId xmlns:p14="http://schemas.microsoft.com/office/powerpoint/2010/main" val="3028572054"/>
+        <p14:creationId xmlns:p14="http://schemas.microsoft.com/office/powerpoint/2010/main" val="4122631926"/>
       </p:ext>
     </p:extLst>
   </p:cSld>
@@ -9318,57 +8650,10 @@
           <a:lstStyle/>
           <a:p>
             <a:r>
-              <a:rPr lang="cs-CZ" sz="4000" dirty="0"/>
-              <a:t>Cíle práce</a:t>
-            </a:r>
-          </a:p>
-        </p:txBody>
-      </p:sp>
-      <p:sp>
-        <p:nvSpPr>
-          <p:cNvPr id="3" name="Content Placeholder 2">
-            <a:extLst>
-              <a:ext uri="{FF2B5EF4-FFF2-40B4-BE49-F238E27FC236}">
-                <a16:creationId xmlns:a16="http://schemas.microsoft.com/office/drawing/2014/main" id="{00155661-0FAF-5BD1-B8EA-8F9137A3B724}"/>
-              </a:ext>
-            </a:extLst>
-          </p:cNvPr>
-          <p:cNvSpPr>
-            <a:spLocks noGrp="1"/>
-          </p:cNvSpPr>
-          <p:nvPr>
-            <p:ph idx="1"/>
-          </p:nvPr>
-        </p:nvSpPr>
-        <p:spPr/>
-        <p:txBody>
-          <a:bodyPr>
-            <a:normAutofit/>
-          </a:bodyPr>
-          <a:lstStyle/>
-          <a:p>
-            <a:r>
-              <a:rPr lang="cs-CZ" sz="2400" i="1" dirty="0"/>
-              <a:t>Ověřte efektivitu programů pomocí nástrojů pro výkonnostní testy a profilování.</a:t>
-            </a:r>
-          </a:p>
-          <a:p>
-            <a:pPr marL="0" indent="0">
-              <a:buNone/>
-            </a:pPr>
-            <a:endParaRPr lang="cs-CZ" sz="2400" i="1" dirty="0"/>
-          </a:p>
-          <a:p>
-            <a:r>
-              <a:rPr lang="cs-CZ" sz="2400" dirty="0"/>
-              <a:t>Získání dat o časování</a:t>
-            </a:r>
-          </a:p>
-          <a:p>
-            <a:r>
-              <a:rPr lang="cs-CZ" sz="2400" dirty="0"/>
-              <a:t>Instrumentační a vzorkovací profilování</a:t>
-            </a:r>
+              <a:rPr lang="en-US" sz="4000" dirty="0" err="1"/>
+              <a:t>Ukázka</a:t>
+            </a:r>
+            <a:endParaRPr lang="cs-CZ" sz="4000" dirty="0"/>
           </a:p>
         </p:txBody>
       </p:sp>
@@ -9395,7 +8680,7 @@
           <a:p>
             <a:fld id="{D422A4B2-A3A8-46E2-928E-95CC170865B2}" type="datetime1">
               <a:rPr lang="cs-CZ" smtClean="0"/>
-              <a:t>23.04.2023</a:t>
+              <a:t>30.04.2023</a:t>
             </a:fld>
             <a:endParaRPr lang="cs-CZ" dirty="0"/>
           </a:p>
@@ -9426,14 +8711,117 @@
               <a:rPr lang="cs-CZ" smtClean="0"/>
               <a:t>8</a:t>
             </a:fld>
+            <a:r>
+              <a:rPr lang="en-US" dirty="0"/>
+              <a:t> /15</a:t>
+            </a:r>
             <a:endParaRPr lang="cs-CZ" dirty="0"/>
           </a:p>
         </p:txBody>
       </p:sp>
+      <p:sp>
+        <p:nvSpPr>
+          <p:cNvPr id="12" name="TextBox 11">
+            <a:extLst>
+              <a:ext uri="{FF2B5EF4-FFF2-40B4-BE49-F238E27FC236}">
+                <a16:creationId xmlns:a16="http://schemas.microsoft.com/office/drawing/2014/main" id="{697A0AB9-D9BA-7CB2-B7CC-43FE2682301F}"/>
+              </a:ext>
+            </a:extLst>
+          </p:cNvPr>
+          <p:cNvSpPr txBox="1"/>
+          <p:nvPr/>
+        </p:nvSpPr>
+        <p:spPr>
+          <a:xfrm>
+            <a:off x="3107434" y="5419344"/>
+            <a:ext cx="5977129" cy="369332"/>
+          </a:xfrm>
+          <a:prstGeom prst="rect">
+            <a:avLst/>
+          </a:prstGeom>
+          <a:noFill/>
+        </p:spPr>
+        <p:txBody>
+          <a:bodyPr wrap="square" rtlCol="0">
+            <a:spAutoFit/>
+          </a:bodyPr>
+          <a:lstStyle/>
+          <a:p>
+            <a:r>
+              <a:rPr lang="cs-CZ" dirty="0"/>
+              <a:t>Obr. 2: Rozložení dat v </a:t>
+            </a:r>
+            <a:r>
+              <a:rPr lang="cs-CZ" dirty="0" err="1"/>
+              <a:t>cache</a:t>
+            </a:r>
+            <a:r>
+              <a:rPr lang="cs-CZ" dirty="0"/>
+              <a:t> OOP</a:t>
+            </a:r>
+            <a:r>
+              <a:rPr lang="en-US" dirty="0"/>
+              <a:t>. [</a:t>
+            </a:r>
+            <a:r>
+              <a:rPr lang="en-US" dirty="0" err="1"/>
+              <a:t>Zdroj</a:t>
+            </a:r>
+            <a:r>
+              <a:rPr lang="en-US" dirty="0"/>
+              <a:t> </a:t>
+            </a:r>
+            <a:r>
+              <a:rPr lang="en-US" dirty="0" err="1"/>
+              <a:t>vlastní</a:t>
+            </a:r>
+            <a:r>
+              <a:rPr lang="en-US" dirty="0"/>
+              <a:t>]</a:t>
+            </a:r>
+            <a:endParaRPr lang="cs-CZ" dirty="0"/>
+          </a:p>
+        </p:txBody>
+      </p:sp>
+      <p:pic>
+        <p:nvPicPr>
+          <p:cNvPr id="8" name="Content Placeholder 7" descr="Table&#10;&#10;Description automatically generated">
+            <a:extLst>
+              <a:ext uri="{FF2B5EF4-FFF2-40B4-BE49-F238E27FC236}">
+                <a16:creationId xmlns:a16="http://schemas.microsoft.com/office/drawing/2014/main" id="{089A361B-461A-A6EB-1354-B783C4F38122}"/>
+              </a:ext>
+            </a:extLst>
+          </p:cNvPr>
+          <p:cNvPicPr>
+            <a:picLocks noGrp="1" noChangeAspect="1"/>
+          </p:cNvPicPr>
+          <p:nvPr>
+            <p:ph idx="1"/>
+          </p:nvPr>
+        </p:nvPicPr>
+        <p:blipFill>
+          <a:blip r:embed="rId2">
+            <a:extLst>
+              <a:ext uri="{28A0092B-C50C-407E-A947-70E740481C1C}">
+                <a14:useLocalDpi xmlns:a14="http://schemas.microsoft.com/office/drawing/2010/main" val="0"/>
+              </a:ext>
+            </a:extLst>
+          </a:blip>
+          <a:stretch>
+            <a:fillRect/>
+          </a:stretch>
+        </p:blipFill>
+        <p:spPr>
+          <a:xfrm>
+            <a:off x="2675528" y="2380860"/>
+            <a:ext cx="6840944" cy="2982711"/>
+          </a:xfrm>
+        </p:spPr>
+      </p:pic>
     </p:spTree>
     <p:extLst>
       <p:ext uri="{BB962C8B-B14F-4D97-AF65-F5344CB8AC3E}">
-        <p14:creationId xmlns:p14="http://schemas.microsoft.com/office/powerpoint/2010/main" val="3194067316"/>
+        <p14:creationId xmlns:p14="http://schemas.microsoft.com/office/powerpoint/2010/main" val="412085139"/>
       </p:ext>
     </p:extLst>
   </p:cSld>
@@ -9482,54 +8870,10 @@
           <a:lstStyle/>
           <a:p>
             <a:r>
-              <a:rPr lang="cs-CZ" sz="4000" dirty="0"/>
-              <a:t>Cíle práce</a:t>
-            </a:r>
-          </a:p>
-        </p:txBody>
-      </p:sp>
-      <p:sp>
-        <p:nvSpPr>
-          <p:cNvPr id="3" name="Content Placeholder 2">
-            <a:extLst>
-              <a:ext uri="{FF2B5EF4-FFF2-40B4-BE49-F238E27FC236}">
-                <a16:creationId xmlns:a16="http://schemas.microsoft.com/office/drawing/2014/main" id="{00155661-0FAF-5BD1-B8EA-8F9137A3B724}"/>
-              </a:ext>
-            </a:extLst>
-          </p:cNvPr>
-          <p:cNvSpPr>
-            <a:spLocks noGrp="1"/>
-          </p:cNvSpPr>
-          <p:nvPr>
-            <p:ph idx="1"/>
-          </p:nvPr>
-        </p:nvSpPr>
-        <p:spPr/>
-        <p:txBody>
-          <a:bodyPr>
-            <a:normAutofit/>
-          </a:bodyPr>
-          <a:lstStyle/>
-          <a:p>
-            <a:r>
-              <a:rPr lang="cs-CZ" sz="2400" i="1" dirty="0"/>
-              <a:t>Sestavte sadu doporučení pro využití datově orientovaného přístupu.</a:t>
-            </a:r>
-          </a:p>
-          <a:p>
-            <a:pPr marL="0" indent="0">
-              <a:buNone/>
-            </a:pPr>
-            <a:endParaRPr lang="cs-CZ" sz="2400" i="1" dirty="0"/>
-          </a:p>
-          <a:p>
-            <a:r>
-              <a:rPr lang="cs-CZ" sz="2400" dirty="0"/>
-              <a:t>Souhrn vhodných optimalizací</a:t>
-            </a:r>
-          </a:p>
-          <a:p>
-            <a:endParaRPr lang="cs-CZ" sz="2400" dirty="0"/>
+              <a:rPr lang="en-US" sz="4000" dirty="0" err="1"/>
+              <a:t>Ukázka</a:t>
+            </a:r>
+            <a:endParaRPr lang="cs-CZ" sz="4000" dirty="0"/>
           </a:p>
         </p:txBody>
       </p:sp>
@@ -9556,7 +8900,7 @@
           <a:p>
             <a:fld id="{D422A4B2-A3A8-46E2-928E-95CC170865B2}" type="datetime1">
               <a:rPr lang="cs-CZ" smtClean="0"/>
-              <a:t>23.04.2023</a:t>
+              <a:t>30.04.2023</a:t>
             </a:fld>
             <a:endParaRPr lang="cs-CZ" dirty="0"/>
           </a:p>
@@ -9587,14 +8931,120 @@
               <a:rPr lang="cs-CZ" smtClean="0"/>
               <a:t>9</a:t>
             </a:fld>
+            <a:r>
+              <a:rPr lang="en-US" dirty="0"/>
+              <a:t> /15</a:t>
+            </a:r>
             <a:endParaRPr lang="cs-CZ" dirty="0"/>
           </a:p>
         </p:txBody>
       </p:sp>
+      <p:sp>
+        <p:nvSpPr>
+          <p:cNvPr id="12" name="TextBox 11">
+            <a:extLst>
+              <a:ext uri="{FF2B5EF4-FFF2-40B4-BE49-F238E27FC236}">
+                <a16:creationId xmlns:a16="http://schemas.microsoft.com/office/drawing/2014/main" id="{697A0AB9-D9BA-7CB2-B7CC-43FE2682301F}"/>
+              </a:ext>
+            </a:extLst>
+          </p:cNvPr>
+          <p:cNvSpPr txBox="1"/>
+          <p:nvPr/>
+        </p:nvSpPr>
+        <p:spPr>
+          <a:xfrm>
+            <a:off x="3450495" y="6467522"/>
+            <a:ext cx="5291003" cy="369332"/>
+          </a:xfrm>
+          <a:prstGeom prst="rect">
+            <a:avLst/>
+          </a:prstGeom>
+          <a:noFill/>
+        </p:spPr>
+        <p:txBody>
+          <a:bodyPr wrap="square" rtlCol="0">
+            <a:spAutoFit/>
+          </a:bodyPr>
+          <a:lstStyle/>
+          <a:p>
+            <a:r>
+              <a:rPr lang="cs-CZ" dirty="0"/>
+              <a:t>Obr. </a:t>
+            </a:r>
+            <a:r>
+              <a:rPr lang="en-US" dirty="0"/>
+              <a:t>3</a:t>
+            </a:r>
+            <a:r>
+              <a:rPr lang="cs-CZ" dirty="0"/>
+              <a:t>: Ukázka </a:t>
+            </a:r>
+            <a:r>
+              <a:rPr lang="en-US" dirty="0"/>
+              <a:t>D</a:t>
+            </a:r>
+            <a:r>
+              <a:rPr lang="cs-CZ" dirty="0"/>
+              <a:t>OP přístupu</a:t>
+            </a:r>
+            <a:r>
+              <a:rPr lang="en-US" dirty="0"/>
+              <a:t>. [</a:t>
+            </a:r>
+            <a:r>
+              <a:rPr lang="en-US" dirty="0" err="1"/>
+              <a:t>Zdroj</a:t>
+            </a:r>
+            <a:r>
+              <a:rPr lang="en-US" dirty="0"/>
+              <a:t> </a:t>
+            </a:r>
+            <a:r>
+              <a:rPr lang="en-US" dirty="0" err="1"/>
+              <a:t>vlastní</a:t>
+            </a:r>
+            <a:r>
+              <a:rPr lang="en-US" dirty="0"/>
+              <a:t>]</a:t>
+            </a:r>
+            <a:endParaRPr lang="cs-CZ" dirty="0"/>
+          </a:p>
+        </p:txBody>
+      </p:sp>
+      <p:pic>
+        <p:nvPicPr>
+          <p:cNvPr id="11" name="Picture 10">
+            <a:extLst>
+              <a:ext uri="{FF2B5EF4-FFF2-40B4-BE49-F238E27FC236}">
+                <a16:creationId xmlns:a16="http://schemas.microsoft.com/office/drawing/2014/main" id="{26EED16B-FD23-D155-17EA-30AF2F7D1FDB}"/>
+              </a:ext>
+            </a:extLst>
+          </p:cNvPr>
+          <p:cNvPicPr>
+            <a:picLocks noChangeAspect="1"/>
+          </p:cNvPicPr>
+          <p:nvPr/>
+        </p:nvPicPr>
+        <p:blipFill>
+          <a:blip r:embed="rId2"/>
+          <a:stretch>
+            <a:fillRect/>
+          </a:stretch>
+        </p:blipFill>
+        <p:spPr>
+          <a:xfrm>
+            <a:off x="2690810" y="2112073"/>
+            <a:ext cx="6810375" cy="4352925"/>
+          </a:xfrm>
+          <a:prstGeom prst="rect">
+            <a:avLst/>
+          </a:prstGeom>
+        </p:spPr>
+      </p:pic>
     </p:spTree>
     <p:extLst>
       <p:ext uri="{BB962C8B-B14F-4D97-AF65-F5344CB8AC3E}">
-        <p14:creationId xmlns:p14="http://schemas.microsoft.com/office/powerpoint/2010/main" val="1884093690"/>
+        <p14:creationId xmlns:p14="http://schemas.microsoft.com/office/powerpoint/2010/main" val="365415222"/>
       </p:ext>
     </p:extLst>
   </p:cSld>

</xml_diff>